<commit_message>
SQL Dump with views, triggers, index and procedure
</commit_message>
<xml_diff>
--- a/Group7.pptx
+++ b/Group7.pptx
@@ -5,10 +5,10 @@
     <p:sldMasterId id="2147483662" r:id="rId1"/>
   </p:sldMasterIdLst>
   <p:notesMasterIdLst>
-    <p:notesMasterId r:id="rId12"/>
+    <p:notesMasterId r:id="rId22"/>
   </p:notesMasterIdLst>
   <p:handoutMasterIdLst>
-    <p:handoutMasterId r:id="rId13"/>
+    <p:handoutMasterId r:id="rId23"/>
   </p:handoutMasterIdLst>
   <p:sldIdLst>
     <p:sldId id="257" r:id="rId2"/>
@@ -21,6 +21,16 @@
     <p:sldId id="262" r:id="rId9"/>
     <p:sldId id="263" r:id="rId10"/>
     <p:sldId id="264" r:id="rId11"/>
+    <p:sldId id="269" r:id="rId12"/>
+    <p:sldId id="267" r:id="rId13"/>
+    <p:sldId id="270" r:id="rId14"/>
+    <p:sldId id="268" r:id="rId15"/>
+    <p:sldId id="271" r:id="rId16"/>
+    <p:sldId id="272" r:id="rId17"/>
+    <p:sldId id="273" r:id="rId18"/>
+    <p:sldId id="274" r:id="rId19"/>
+    <p:sldId id="275" r:id="rId20"/>
+    <p:sldId id="276" r:id="rId21"/>
   </p:sldIdLst>
   <p:sldSz cx="9144000" cy="6858000" type="screen4x3"/>
   <p:notesSz cx="9144000" cy="6858000"/>
@@ -221,7 +231,7 @@
             <a:fld id="{F4CBC376-739F-4B85-9D93-6A74D5A2CD21}" type="datetimeFigureOut">
               <a:rPr lang="en-US" smtClean="0"/>
               <a:pPr/>
-              <a:t>11/26/2019</a:t>
+              <a:t>12/1/2019</a:t>
             </a:fld>
             <a:endParaRPr lang="en-US"/>
           </a:p>
@@ -383,7 +393,7 @@
             <a:fld id="{79F49AED-2701-4563-8C53-40795C402EBA}" type="datetimeFigureOut">
               <a:rPr lang="en-US" smtClean="0"/>
               <a:pPr/>
-              <a:t>11/26/2019</a:t>
+              <a:t>12/1/2019</a:t>
             </a:fld>
             <a:endParaRPr lang="en-US"/>
           </a:p>
@@ -735,7 +745,7 @@
             <a:fld id="{81331B57-0BE5-4F82-AA58-76F53EFF3ADA}" type="datetime8">
               <a:rPr lang="en-US" smtClean="0"/>
               <a:pPr/>
-              <a:t>11/26/2019 1:27 AM</a:t>
+              <a:t>12/1/2019 11:36 PM</a:t>
             </a:fld>
             <a:endParaRPr lang="en-US" dirty="0"/>
           </a:p>
@@ -2694,10 +2704,9 @@
           <a:p>
             <a:pPr algn="ctr"/>
             <a:r>
-              <a:rPr lang="en-US"/>
-              <a:t>Deliverable 3</a:t>
-            </a:r>
-            <a:endParaRPr lang="en-US" dirty="0"/>
+              <a:rPr lang="en-US" dirty="0"/>
+              <a:t>Deliverable 4</a:t>
+            </a:r>
           </a:p>
         </p:txBody>
       </p:sp>
@@ -2781,7 +2790,7 @@
           <p:nvPr>
             <p:extLst>
               <p:ext uri="{D42A27DB-BD31-4B8C-83A1-F6EECF244321}">
-                <p14:modId xmlns:p14="http://schemas.microsoft.com/office/powerpoint/2010/main" val="1860758918"/>
+                <p14:modId xmlns:p14="http://schemas.microsoft.com/office/powerpoint/2010/main" val="3914041420"/>
               </p:ext>
             </p:extLst>
           </p:nvPr>
@@ -2877,12 +2886,12 @@
                     <a:p>
                       <a:pPr algn="l" fontAlgn="b"/>
                       <a:r>
-                        <a:rPr lang="en-US" sz="1100" u="none" strike="noStrike">
+                        <a:rPr lang="en-US" sz="1100" u="none" strike="noStrike" dirty="0">
                           <a:effectLst/>
                         </a:rPr>
                         <a:t>Name</a:t>
                       </a:r>
-                      <a:endParaRPr lang="en-US" sz="1100" b="0" i="0" u="none" strike="noStrike">
+                      <a:endParaRPr lang="en-US" sz="1100" b="0" i="0" u="none" strike="noStrike" dirty="0">
                         <a:solidFill>
                           <a:srgbClr val="000000"/>
                         </a:solidFill>
@@ -2923,12 +2932,12 @@
                     <a:p>
                       <a:pPr algn="l" fontAlgn="b"/>
                       <a:r>
-                        <a:rPr lang="en-US" sz="1100" u="none" strike="noStrike">
+                        <a:rPr lang="en-US" sz="1100" u="none" strike="noStrike" dirty="0">
                           <a:effectLst/>
                         </a:rPr>
                         <a:t>UNCC ID</a:t>
                       </a:r>
-                      <a:endParaRPr lang="en-US" sz="1100" b="0" i="0" u="none" strike="noStrike">
+                      <a:endParaRPr lang="en-US" sz="1100" b="0" i="0" u="none" strike="noStrike" dirty="0">
                         <a:solidFill>
                           <a:srgbClr val="000000"/>
                         </a:solidFill>
@@ -2974,14 +2983,14 @@
                     <a:bodyPr/>
                     <a:lstStyle/>
                     <a:p>
-                      <a:pPr algn="r" fontAlgn="b"/>
-                      <a:r>
-                        <a:rPr lang="en-US" sz="1100" u="none" strike="noStrike">
+                      <a:pPr algn="l" fontAlgn="b"/>
+                      <a:r>
+                        <a:rPr lang="en-US" sz="1100" u="none" strike="noStrike" dirty="0">
                           <a:effectLst/>
                         </a:rPr>
                         <a:t>801077164</a:t>
                       </a:r>
-                      <a:endParaRPr lang="en-US" sz="1100" b="0" i="0" u="none" strike="noStrike">
+                      <a:endParaRPr lang="en-US" sz="1100" b="0" i="0" u="none" strike="noStrike" dirty="0">
                         <a:solidFill>
                           <a:srgbClr val="000000"/>
                         </a:solidFill>
@@ -3050,7 +3059,7 @@
                     <a:bodyPr/>
                     <a:lstStyle/>
                     <a:p>
-                      <a:pPr algn="r" fontAlgn="b"/>
+                      <a:pPr algn="l" fontAlgn="b"/>
                       <a:r>
                         <a:rPr lang="en-US" sz="1100" u="none" strike="noStrike" dirty="0">
                           <a:effectLst/>
@@ -3126,14 +3135,14 @@
                     <a:bodyPr/>
                     <a:lstStyle/>
                     <a:p>
-                      <a:pPr algn="r" fontAlgn="b"/>
-                      <a:r>
-                        <a:rPr lang="en-US" sz="1100" u="none" strike="noStrike">
+                      <a:pPr algn="l" fontAlgn="b"/>
+                      <a:r>
+                        <a:rPr lang="en-US" sz="1100" u="none" strike="noStrike" dirty="0">
                           <a:effectLst/>
                         </a:rPr>
                         <a:t>801135233</a:t>
                       </a:r>
-                      <a:endParaRPr lang="en-US" sz="1100" b="0" i="0" u="none" strike="noStrike">
+                      <a:endParaRPr lang="en-US" sz="1100" b="0" i="0" u="none" strike="noStrike" dirty="0">
                         <a:solidFill>
                           <a:srgbClr val="000000"/>
                         </a:solidFill>
@@ -3202,14 +3211,14 @@
                     <a:bodyPr/>
                     <a:lstStyle/>
                     <a:p>
-                      <a:pPr algn="r" fontAlgn="b"/>
-                      <a:r>
-                        <a:rPr lang="en-US" sz="1100" u="none" strike="noStrike">
+                      <a:pPr algn="l" fontAlgn="b"/>
+                      <a:r>
+                        <a:rPr lang="en-US" sz="1100" u="none" strike="noStrike" dirty="0">
                           <a:effectLst/>
                         </a:rPr>
                         <a:t>801081768</a:t>
                       </a:r>
-                      <a:endParaRPr lang="en-US" sz="1100" b="0" i="0" u="none" strike="noStrike">
+                      <a:endParaRPr lang="en-US" sz="1100" b="0" i="0" u="none" strike="noStrike" dirty="0">
                         <a:solidFill>
                           <a:srgbClr val="000000"/>
                         </a:solidFill>
@@ -7066,6 +7075,3278 @@
 </p:sld>
 </file>
 
+<file path=ppt/slides/slide11.xml><?xml version="1.0" encoding="utf-8"?>
+<p:sld xmlns:a="http://schemas.openxmlformats.org/drawingml/2006/main" xmlns:r="http://schemas.openxmlformats.org/officeDocument/2006/relationships" xmlns:p="http://schemas.openxmlformats.org/presentationml/2006/main">
+  <p:cSld>
+    <p:spTree>
+      <p:nvGrpSpPr>
+        <p:cNvPr id="1" name=""/>
+        <p:cNvGrpSpPr/>
+        <p:nvPr/>
+      </p:nvGrpSpPr>
+      <p:grpSpPr>
+        <a:xfrm>
+          <a:off x="0" y="0"/>
+          <a:ext cx="0" cy="0"/>
+          <a:chOff x="0" y="0"/>
+          <a:chExt cx="0" cy="0"/>
+        </a:xfrm>
+      </p:grpSpPr>
+      <p:sp>
+        <p:nvSpPr>
+          <p:cNvPr id="4" name="Text Placeholder 3">
+            <a:extLst>
+              <a:ext uri="{FF2B5EF4-FFF2-40B4-BE49-F238E27FC236}">
+                <a16:creationId xmlns:a16="http://schemas.microsoft.com/office/drawing/2014/main" id="{7FDB85F9-8D3A-4A5E-B87F-28284264B7F8}"/>
+              </a:ext>
+            </a:extLst>
+          </p:cNvPr>
+          <p:cNvSpPr>
+            <a:spLocks noGrp="1"/>
+          </p:cNvSpPr>
+          <p:nvPr>
+            <p:ph type="body" sz="quarter" idx="10"/>
+          </p:nvPr>
+        </p:nvSpPr>
+        <p:spPr>
+          <a:xfrm>
+            <a:off x="726943" y="1828800"/>
+            <a:ext cx="7690114" cy="1384994"/>
+          </a:xfrm>
+        </p:spPr>
+        <p:txBody>
+          <a:bodyPr/>
+          <a:lstStyle/>
+          <a:p>
+            <a:pPr algn="ctr"/>
+            <a:r>
+              <a:rPr lang="en-US" dirty="0"/>
+              <a:t>ADVANCED SQL STATEMENTS</a:t>
+            </a:r>
+          </a:p>
+        </p:txBody>
+      </p:sp>
+    </p:spTree>
+    <p:extLst>
+      <p:ext uri="{BB962C8B-B14F-4D97-AF65-F5344CB8AC3E}">
+        <p14:creationId xmlns:p14="http://schemas.microsoft.com/office/powerpoint/2010/main" val="2111385783"/>
+      </p:ext>
+    </p:extLst>
+  </p:cSld>
+  <p:clrMapOvr>
+    <a:masterClrMapping/>
+  </p:clrMapOvr>
+  <p:transition>
+    <p:fade/>
+  </p:transition>
+</p:sld>
+</file>
+
+<file path=ppt/slides/slide12.xml><?xml version="1.0" encoding="utf-8"?>
+<p:sld xmlns:a="http://schemas.openxmlformats.org/drawingml/2006/main" xmlns:r="http://schemas.openxmlformats.org/officeDocument/2006/relationships" xmlns:p="http://schemas.openxmlformats.org/presentationml/2006/main">
+  <p:cSld>
+    <p:spTree>
+      <p:nvGrpSpPr>
+        <p:cNvPr id="1" name=""/>
+        <p:cNvGrpSpPr/>
+        <p:nvPr/>
+      </p:nvGrpSpPr>
+      <p:grpSpPr>
+        <a:xfrm>
+          <a:off x="0" y="0"/>
+          <a:ext cx="0" cy="0"/>
+          <a:chOff x="0" y="0"/>
+          <a:chExt cx="0" cy="0"/>
+        </a:xfrm>
+      </p:grpSpPr>
+      <p:sp>
+        <p:nvSpPr>
+          <p:cNvPr id="2" name="Title 1">
+            <a:extLst>
+              <a:ext uri="{FF2B5EF4-FFF2-40B4-BE49-F238E27FC236}">
+                <a16:creationId xmlns:a16="http://schemas.microsoft.com/office/drawing/2014/main" id="{115D8A98-645F-4687-8E13-D8689B22B101}"/>
+              </a:ext>
+            </a:extLst>
+          </p:cNvPr>
+          <p:cNvSpPr>
+            <a:spLocks noGrp="1"/>
+          </p:cNvSpPr>
+          <p:nvPr>
+            <p:ph type="ctrTitle"/>
+          </p:nvPr>
+        </p:nvSpPr>
+        <p:spPr>
+          <a:xfrm>
+            <a:off x="1369219" y="295374"/>
+            <a:ext cx="7043208" cy="304799"/>
+          </a:xfrm>
+        </p:spPr>
+        <p:txBody>
+          <a:bodyPr/>
+          <a:lstStyle/>
+          <a:p>
+            <a:pPr algn="ctr"/>
+            <a:r>
+              <a:rPr lang="en-US" dirty="0"/>
+              <a:t>Stored Procedure</a:t>
+            </a:r>
+          </a:p>
+        </p:txBody>
+      </p:sp>
+      <p:sp>
+        <p:nvSpPr>
+          <p:cNvPr id="3" name="Subtitle 2">
+            <a:extLst>
+              <a:ext uri="{FF2B5EF4-FFF2-40B4-BE49-F238E27FC236}">
+                <a16:creationId xmlns:a16="http://schemas.microsoft.com/office/drawing/2014/main" id="{E67D3822-69E4-4566-8C59-2163891D5869}"/>
+              </a:ext>
+            </a:extLst>
+          </p:cNvPr>
+          <p:cNvSpPr>
+            <a:spLocks noGrp="1"/>
+          </p:cNvSpPr>
+          <p:nvPr>
+            <p:ph type="subTitle" idx="1"/>
+          </p:nvPr>
+        </p:nvSpPr>
+        <p:spPr>
+          <a:xfrm>
+            <a:off x="533400" y="762000"/>
+            <a:ext cx="8305800" cy="5035253"/>
+          </a:xfrm>
+        </p:spPr>
+        <p:txBody>
+          <a:bodyPr/>
+          <a:lstStyle/>
+          <a:p>
+            <a:pPr algn="just"/>
+            <a:r>
+              <a:rPr lang="en-US" sz="1800" dirty="0"/>
+              <a:t>Below stored procedure will insert values in person table, depending on </a:t>
+            </a:r>
+            <a:r>
+              <a:rPr lang="en-US" sz="1800" dirty="0" err="1"/>
+              <a:t>person_type</a:t>
+            </a:r>
+            <a:r>
+              <a:rPr lang="en-US" sz="1800" dirty="0"/>
+              <a:t> values will be inserted in student/ faculty/ staff tables.</a:t>
+            </a:r>
+          </a:p>
+          <a:p>
+            <a:pPr algn="just"/>
+            <a:endParaRPr lang="en-US" sz="1800" dirty="0"/>
+          </a:p>
+          <a:p>
+            <a:pPr algn="just"/>
+            <a:r>
+              <a:rPr lang="en-US" sz="1800" dirty="0">
+                <a:solidFill>
+                  <a:schemeClr val="accent1">
+                    <a:lumMod val="20000"/>
+                    <a:lumOff val="80000"/>
+                  </a:schemeClr>
+                </a:solidFill>
+              </a:rPr>
+              <a:t>CREATE DEFINER=`</a:t>
+            </a:r>
+            <a:r>
+              <a:rPr lang="en-US" sz="1800" dirty="0" err="1">
+                <a:solidFill>
+                  <a:schemeClr val="accent1">
+                    <a:lumMod val="20000"/>
+                    <a:lumOff val="80000"/>
+                  </a:schemeClr>
+                </a:solidFill>
+              </a:rPr>
+              <a:t>root`@`localhost</a:t>
+            </a:r>
+            <a:r>
+              <a:rPr lang="en-US" sz="1800" dirty="0">
+                <a:solidFill>
+                  <a:schemeClr val="accent1">
+                    <a:lumMod val="20000"/>
+                    <a:lumOff val="80000"/>
+                  </a:schemeClr>
+                </a:solidFill>
+              </a:rPr>
+              <a:t>` PROCEDURE `</a:t>
+            </a:r>
+            <a:r>
+              <a:rPr lang="en-US" sz="1800" dirty="0" err="1">
+                <a:solidFill>
+                  <a:schemeClr val="accent1">
+                    <a:lumMod val="20000"/>
+                    <a:lumOff val="80000"/>
+                  </a:schemeClr>
+                </a:solidFill>
+              </a:rPr>
+              <a:t>add_person</a:t>
+            </a:r>
+            <a:r>
+              <a:rPr lang="en-US" sz="1800" dirty="0">
+                <a:solidFill>
+                  <a:schemeClr val="accent1">
+                    <a:lumMod val="20000"/>
+                    <a:lumOff val="80000"/>
+                  </a:schemeClr>
+                </a:solidFill>
+              </a:rPr>
+              <a:t>`(in </a:t>
+            </a:r>
+            <a:r>
+              <a:rPr lang="en-US" sz="1800" dirty="0" err="1">
+                <a:solidFill>
+                  <a:schemeClr val="accent1">
+                    <a:lumMod val="20000"/>
+                    <a:lumOff val="80000"/>
+                  </a:schemeClr>
+                </a:solidFill>
+              </a:rPr>
+              <a:t>person_name</a:t>
+            </a:r>
+            <a:r>
+              <a:rPr lang="en-US" sz="1800" dirty="0">
+                <a:solidFill>
+                  <a:schemeClr val="accent1">
+                    <a:lumMod val="20000"/>
+                    <a:lumOff val="80000"/>
+                  </a:schemeClr>
+                </a:solidFill>
+              </a:rPr>
+              <a:t> varchar(300), in email varchar(150), </a:t>
+            </a:r>
+            <a:r>
+              <a:rPr lang="en-US" sz="1800" dirty="0" err="1">
+                <a:solidFill>
+                  <a:schemeClr val="accent1">
+                    <a:lumMod val="20000"/>
+                    <a:lumOff val="80000"/>
+                  </a:schemeClr>
+                </a:solidFill>
+              </a:rPr>
+              <a:t>cellno</a:t>
+            </a:r>
+            <a:r>
+              <a:rPr lang="en-US" sz="1800" dirty="0">
+                <a:solidFill>
+                  <a:schemeClr val="accent1">
+                    <a:lumMod val="20000"/>
+                    <a:lumOff val="80000"/>
+                  </a:schemeClr>
+                </a:solidFill>
+              </a:rPr>
+              <a:t> </a:t>
+            </a:r>
+            <a:r>
+              <a:rPr lang="en-US" sz="1800" dirty="0" err="1">
+                <a:solidFill>
+                  <a:schemeClr val="accent1">
+                    <a:lumMod val="20000"/>
+                    <a:lumOff val="80000"/>
+                  </a:schemeClr>
+                </a:solidFill>
+              </a:rPr>
+              <a:t>bigint</a:t>
+            </a:r>
+            <a:r>
+              <a:rPr lang="en-US" sz="1800" dirty="0">
+                <a:solidFill>
+                  <a:schemeClr val="accent1">
+                    <a:lumMod val="20000"/>
+                    <a:lumOff val="80000"/>
+                  </a:schemeClr>
+                </a:solidFill>
+              </a:rPr>
+              <a:t> (15), </a:t>
+            </a:r>
+            <a:r>
+              <a:rPr lang="en-US" sz="1800" dirty="0" err="1">
+                <a:solidFill>
+                  <a:schemeClr val="accent1">
+                    <a:lumMod val="20000"/>
+                    <a:lumOff val="80000"/>
+                  </a:schemeClr>
+                </a:solidFill>
+              </a:rPr>
+              <a:t>person_type</a:t>
+            </a:r>
+            <a:r>
+              <a:rPr lang="en-US" sz="1800" dirty="0">
+                <a:solidFill>
+                  <a:schemeClr val="accent1">
+                    <a:lumMod val="20000"/>
+                    <a:lumOff val="80000"/>
+                  </a:schemeClr>
+                </a:solidFill>
+              </a:rPr>
+              <a:t> varchar(10))</a:t>
+            </a:r>
+          </a:p>
+          <a:p>
+            <a:pPr algn="just"/>
+            <a:r>
+              <a:rPr lang="en-US" sz="1800" dirty="0">
+                <a:solidFill>
+                  <a:schemeClr val="accent1">
+                    <a:lumMod val="20000"/>
+                    <a:lumOff val="80000"/>
+                  </a:schemeClr>
+                </a:solidFill>
+              </a:rPr>
+              <a:t>BEGIN</a:t>
+            </a:r>
+          </a:p>
+          <a:p>
+            <a:pPr algn="just"/>
+            <a:r>
+              <a:rPr lang="en-US" sz="1800" dirty="0">
+                <a:solidFill>
+                  <a:schemeClr val="accent1">
+                    <a:lumMod val="20000"/>
+                    <a:lumOff val="80000"/>
+                  </a:schemeClr>
+                </a:solidFill>
+              </a:rPr>
+              <a:t>insert into person (</a:t>
+            </a:r>
+            <a:r>
+              <a:rPr lang="en-US" sz="1800" dirty="0" err="1">
+                <a:solidFill>
+                  <a:schemeClr val="accent1">
+                    <a:lumMod val="20000"/>
+                    <a:lumOff val="80000"/>
+                  </a:schemeClr>
+                </a:solidFill>
+              </a:rPr>
+              <a:t>person_name</a:t>
+            </a:r>
+            <a:r>
+              <a:rPr lang="en-US" sz="1800" dirty="0">
+                <a:solidFill>
+                  <a:schemeClr val="accent1">
+                    <a:lumMod val="20000"/>
+                    <a:lumOff val="80000"/>
+                  </a:schemeClr>
+                </a:solidFill>
+              </a:rPr>
+              <a:t>, </a:t>
+            </a:r>
+            <a:r>
+              <a:rPr lang="en-US" sz="1800" dirty="0" err="1">
+                <a:solidFill>
+                  <a:schemeClr val="accent1">
+                    <a:lumMod val="20000"/>
+                    <a:lumOff val="80000"/>
+                  </a:schemeClr>
+                </a:solidFill>
+              </a:rPr>
+              <a:t>person_email</a:t>
+            </a:r>
+            <a:r>
+              <a:rPr lang="en-US" sz="1800" dirty="0">
+                <a:solidFill>
+                  <a:schemeClr val="accent1">
+                    <a:lumMod val="20000"/>
+                    <a:lumOff val="80000"/>
+                  </a:schemeClr>
+                </a:solidFill>
+              </a:rPr>
+              <a:t>, cell) values(</a:t>
+            </a:r>
+            <a:r>
+              <a:rPr lang="en-US" sz="1800" dirty="0" err="1">
+                <a:solidFill>
+                  <a:schemeClr val="accent1">
+                    <a:lumMod val="20000"/>
+                    <a:lumOff val="80000"/>
+                  </a:schemeClr>
+                </a:solidFill>
+              </a:rPr>
+              <a:t>person_name</a:t>
+            </a:r>
+            <a:r>
+              <a:rPr lang="en-US" sz="1800" dirty="0">
+                <a:solidFill>
+                  <a:schemeClr val="accent1">
+                    <a:lumMod val="20000"/>
+                    <a:lumOff val="80000"/>
+                  </a:schemeClr>
+                </a:solidFill>
+              </a:rPr>
+              <a:t>, email, </a:t>
+            </a:r>
+            <a:r>
+              <a:rPr lang="en-US" sz="1800" dirty="0" err="1">
+                <a:solidFill>
+                  <a:schemeClr val="accent1">
+                    <a:lumMod val="20000"/>
+                    <a:lumOff val="80000"/>
+                  </a:schemeClr>
+                </a:solidFill>
+              </a:rPr>
+              <a:t>cellno</a:t>
+            </a:r>
+            <a:r>
+              <a:rPr lang="en-US" sz="1800" dirty="0">
+                <a:solidFill>
+                  <a:schemeClr val="accent1">
+                    <a:lumMod val="20000"/>
+                    <a:lumOff val="80000"/>
+                  </a:schemeClr>
+                </a:solidFill>
+              </a:rPr>
+              <a:t>);</a:t>
+            </a:r>
+          </a:p>
+          <a:p>
+            <a:pPr algn="just"/>
+            <a:r>
+              <a:rPr lang="en-US" sz="1800" dirty="0">
+                <a:solidFill>
+                  <a:schemeClr val="accent1">
+                    <a:lumMod val="20000"/>
+                    <a:lumOff val="80000"/>
+                  </a:schemeClr>
+                </a:solidFill>
+              </a:rPr>
+              <a:t>if(</a:t>
+            </a:r>
+            <a:r>
+              <a:rPr lang="en-US" sz="1800" dirty="0" err="1">
+                <a:solidFill>
+                  <a:schemeClr val="accent1">
+                    <a:lumMod val="20000"/>
+                    <a:lumOff val="80000"/>
+                  </a:schemeClr>
+                </a:solidFill>
+              </a:rPr>
+              <a:t>person_type</a:t>
+            </a:r>
+            <a:r>
+              <a:rPr lang="en-US" sz="1800" dirty="0">
+                <a:solidFill>
+                  <a:schemeClr val="accent1">
+                    <a:lumMod val="20000"/>
+                    <a:lumOff val="80000"/>
+                  </a:schemeClr>
+                </a:solidFill>
+              </a:rPr>
+              <a:t> = 'student') then</a:t>
+            </a:r>
+          </a:p>
+          <a:p>
+            <a:pPr algn="just"/>
+            <a:r>
+              <a:rPr lang="en-US" sz="1800" dirty="0">
+                <a:solidFill>
+                  <a:schemeClr val="accent1">
+                    <a:lumMod val="20000"/>
+                    <a:lumOff val="80000"/>
+                  </a:schemeClr>
+                </a:solidFill>
+              </a:rPr>
+              <a:t>insert into student (</a:t>
+            </a:r>
+            <a:r>
+              <a:rPr lang="en-US" sz="1800" dirty="0" err="1">
+                <a:solidFill>
+                  <a:schemeClr val="accent1">
+                    <a:lumMod val="20000"/>
+                    <a:lumOff val="80000"/>
+                  </a:schemeClr>
+                </a:solidFill>
+              </a:rPr>
+              <a:t>person_id</a:t>
+            </a:r>
+            <a:r>
+              <a:rPr lang="en-US" sz="1800" dirty="0">
+                <a:solidFill>
+                  <a:schemeClr val="accent1">
+                    <a:lumMod val="20000"/>
+                    <a:lumOff val="80000"/>
+                  </a:schemeClr>
+                </a:solidFill>
+              </a:rPr>
+              <a:t>, </a:t>
+            </a:r>
+            <a:r>
+              <a:rPr lang="en-US" sz="1800" dirty="0" err="1">
+                <a:solidFill>
+                  <a:schemeClr val="accent1">
+                    <a:lumMod val="20000"/>
+                    <a:lumOff val="80000"/>
+                  </a:schemeClr>
+                </a:solidFill>
+              </a:rPr>
+              <a:t>graduation_year</a:t>
+            </a:r>
+            <a:r>
+              <a:rPr lang="en-US" sz="1800" dirty="0">
+                <a:solidFill>
+                  <a:schemeClr val="accent1">
+                    <a:lumMod val="20000"/>
+                    <a:lumOff val="80000"/>
+                  </a:schemeClr>
+                </a:solidFill>
+              </a:rPr>
+              <a:t>, major, type) values </a:t>
+            </a:r>
+          </a:p>
+          <a:p>
+            <a:pPr algn="just"/>
+            <a:r>
+              <a:rPr lang="en-US" sz="1800" dirty="0">
+                <a:solidFill>
+                  <a:schemeClr val="accent1">
+                    <a:lumMod val="20000"/>
+                    <a:lumOff val="80000"/>
+                  </a:schemeClr>
+                </a:solidFill>
+              </a:rPr>
+              <a:t>((select </a:t>
+            </a:r>
+            <a:r>
+              <a:rPr lang="en-US" sz="1800" dirty="0" err="1">
+                <a:solidFill>
+                  <a:schemeClr val="accent1">
+                    <a:lumMod val="20000"/>
+                    <a:lumOff val="80000"/>
+                  </a:schemeClr>
+                </a:solidFill>
+              </a:rPr>
+              <a:t>person_id</a:t>
+            </a:r>
+            <a:r>
+              <a:rPr lang="en-US" sz="1800" dirty="0">
+                <a:solidFill>
+                  <a:schemeClr val="accent1">
+                    <a:lumMod val="20000"/>
+                    <a:lumOff val="80000"/>
+                  </a:schemeClr>
+                </a:solidFill>
+              </a:rPr>
+              <a:t> from person where cell = </a:t>
+            </a:r>
+            <a:r>
+              <a:rPr lang="en-US" sz="1800" dirty="0" err="1">
+                <a:solidFill>
+                  <a:schemeClr val="accent1">
+                    <a:lumMod val="20000"/>
+                    <a:lumOff val="80000"/>
+                  </a:schemeClr>
+                </a:solidFill>
+              </a:rPr>
+              <a:t>cellno</a:t>
+            </a:r>
+            <a:r>
+              <a:rPr lang="en-US" sz="1800" dirty="0">
+                <a:solidFill>
+                  <a:schemeClr val="accent1">
+                    <a:lumMod val="20000"/>
+                    <a:lumOff val="80000"/>
+                  </a:schemeClr>
+                </a:solidFill>
+              </a:rPr>
+              <a:t>), 2019, 'Computer Science', 'Graduate');</a:t>
+            </a:r>
+          </a:p>
+          <a:p>
+            <a:pPr algn="just"/>
+            <a:r>
+              <a:rPr lang="en-US" sz="1800" dirty="0">
+                <a:solidFill>
+                  <a:schemeClr val="accent1">
+                    <a:lumMod val="20000"/>
+                    <a:lumOff val="80000"/>
+                  </a:schemeClr>
+                </a:solidFill>
+              </a:rPr>
+              <a:t>elseif(</a:t>
+            </a:r>
+            <a:r>
+              <a:rPr lang="en-US" sz="1800" dirty="0" err="1">
+                <a:solidFill>
+                  <a:schemeClr val="accent1">
+                    <a:lumMod val="20000"/>
+                    <a:lumOff val="80000"/>
+                  </a:schemeClr>
+                </a:solidFill>
+              </a:rPr>
+              <a:t>person_type</a:t>
+            </a:r>
+            <a:r>
+              <a:rPr lang="en-US" sz="1800" dirty="0">
+                <a:solidFill>
+                  <a:schemeClr val="accent1">
+                    <a:lumMod val="20000"/>
+                    <a:lumOff val="80000"/>
+                  </a:schemeClr>
+                </a:solidFill>
+              </a:rPr>
+              <a:t> = 'faculty') then</a:t>
+            </a:r>
+          </a:p>
+          <a:p>
+            <a:pPr algn="just"/>
+            <a:r>
+              <a:rPr lang="en-US" sz="1800" dirty="0">
+                <a:solidFill>
+                  <a:schemeClr val="accent1">
+                    <a:lumMod val="20000"/>
+                    <a:lumOff val="80000"/>
+                  </a:schemeClr>
+                </a:solidFill>
+              </a:rPr>
+              <a:t>insert into faculty (</a:t>
+            </a:r>
+            <a:r>
+              <a:rPr lang="en-US" sz="1800" dirty="0" err="1">
+                <a:solidFill>
+                  <a:schemeClr val="accent1">
+                    <a:lumMod val="20000"/>
+                    <a:lumOff val="80000"/>
+                  </a:schemeClr>
+                </a:solidFill>
+              </a:rPr>
+              <a:t>person_id</a:t>
+            </a:r>
+            <a:r>
+              <a:rPr lang="en-US" sz="1800" dirty="0">
+                <a:solidFill>
+                  <a:schemeClr val="accent1">
+                    <a:lumMod val="20000"/>
+                    <a:lumOff val="80000"/>
+                  </a:schemeClr>
+                </a:solidFill>
+              </a:rPr>
+              <a:t>, title, </a:t>
+            </a:r>
+            <a:r>
+              <a:rPr lang="en-US" sz="1800" dirty="0" err="1">
+                <a:solidFill>
+                  <a:schemeClr val="accent1">
+                    <a:lumMod val="20000"/>
+                    <a:lumOff val="80000"/>
+                  </a:schemeClr>
+                </a:solidFill>
+              </a:rPr>
+              <a:t>degree_college</a:t>
+            </a:r>
+            <a:r>
+              <a:rPr lang="en-US" sz="1800" dirty="0">
+                <a:solidFill>
+                  <a:schemeClr val="accent1">
+                    <a:lumMod val="20000"/>
+                    <a:lumOff val="80000"/>
+                  </a:schemeClr>
+                </a:solidFill>
+              </a:rPr>
+              <a:t>, </a:t>
+            </a:r>
+            <a:r>
+              <a:rPr lang="en-US" sz="1800" dirty="0" err="1">
+                <a:solidFill>
+                  <a:schemeClr val="accent1">
+                    <a:lumMod val="20000"/>
+                    <a:lumOff val="80000"/>
+                  </a:schemeClr>
+                </a:solidFill>
+              </a:rPr>
+              <a:t>highest_degree</a:t>
+            </a:r>
+            <a:r>
+              <a:rPr lang="en-US" sz="1800" dirty="0">
+                <a:solidFill>
+                  <a:schemeClr val="accent1">
+                    <a:lumMod val="20000"/>
+                    <a:lumOff val="80000"/>
+                  </a:schemeClr>
+                </a:solidFill>
+              </a:rPr>
+              <a:t>) values </a:t>
+            </a:r>
+          </a:p>
+          <a:p>
+            <a:pPr algn="just"/>
+            <a:r>
+              <a:rPr lang="en-US" sz="1800" dirty="0">
+                <a:solidFill>
+                  <a:schemeClr val="accent1">
+                    <a:lumMod val="20000"/>
+                    <a:lumOff val="80000"/>
+                  </a:schemeClr>
+                </a:solidFill>
+              </a:rPr>
+              <a:t>((select </a:t>
+            </a:r>
+            <a:r>
+              <a:rPr lang="en-US" sz="1800" dirty="0" err="1">
+                <a:solidFill>
+                  <a:schemeClr val="accent1">
+                    <a:lumMod val="20000"/>
+                    <a:lumOff val="80000"/>
+                  </a:schemeClr>
+                </a:solidFill>
+              </a:rPr>
+              <a:t>person_id</a:t>
+            </a:r>
+            <a:r>
+              <a:rPr lang="en-US" sz="1800" dirty="0">
+                <a:solidFill>
+                  <a:schemeClr val="accent1">
+                    <a:lumMod val="20000"/>
+                    <a:lumOff val="80000"/>
+                  </a:schemeClr>
+                </a:solidFill>
+              </a:rPr>
+              <a:t> from person where cell = </a:t>
+            </a:r>
+            <a:r>
+              <a:rPr lang="en-US" sz="1800" dirty="0" err="1">
+                <a:solidFill>
+                  <a:schemeClr val="accent1">
+                    <a:lumMod val="20000"/>
+                    <a:lumOff val="80000"/>
+                  </a:schemeClr>
+                </a:solidFill>
+              </a:rPr>
+              <a:t>cellno</a:t>
+            </a:r>
+            <a:r>
+              <a:rPr lang="en-US" sz="1800" dirty="0">
+                <a:solidFill>
+                  <a:schemeClr val="accent1">
+                    <a:lumMod val="20000"/>
+                    <a:lumOff val="80000"/>
+                  </a:schemeClr>
+                </a:solidFill>
+              </a:rPr>
+              <a:t>), 'Assistant Professor', 'UCLA', 'PhD');</a:t>
+            </a:r>
+          </a:p>
+          <a:p>
+            <a:pPr algn="just"/>
+            <a:r>
+              <a:rPr lang="en-US" sz="1800" dirty="0">
+                <a:solidFill>
+                  <a:schemeClr val="accent1">
+                    <a:lumMod val="20000"/>
+                    <a:lumOff val="80000"/>
+                  </a:schemeClr>
+                </a:solidFill>
+              </a:rPr>
+              <a:t>elseif(</a:t>
+            </a:r>
+            <a:r>
+              <a:rPr lang="en-US" sz="1800" dirty="0" err="1">
+                <a:solidFill>
+                  <a:schemeClr val="accent1">
+                    <a:lumMod val="20000"/>
+                    <a:lumOff val="80000"/>
+                  </a:schemeClr>
+                </a:solidFill>
+              </a:rPr>
+              <a:t>person_type</a:t>
+            </a:r>
+            <a:r>
+              <a:rPr lang="en-US" sz="1800" dirty="0">
+                <a:solidFill>
+                  <a:schemeClr val="accent1">
+                    <a:lumMod val="20000"/>
+                    <a:lumOff val="80000"/>
+                  </a:schemeClr>
+                </a:solidFill>
+              </a:rPr>
+              <a:t> = 'staff') then</a:t>
+            </a:r>
+          </a:p>
+          <a:p>
+            <a:pPr algn="just"/>
+            <a:r>
+              <a:rPr lang="en-US" sz="1800" dirty="0">
+                <a:solidFill>
+                  <a:schemeClr val="accent1">
+                    <a:lumMod val="20000"/>
+                    <a:lumOff val="80000"/>
+                  </a:schemeClr>
+                </a:solidFill>
+              </a:rPr>
+              <a:t>insert into student (</a:t>
+            </a:r>
+            <a:r>
+              <a:rPr lang="en-US" sz="1800" dirty="0" err="1">
+                <a:solidFill>
+                  <a:schemeClr val="accent1">
+                    <a:lumMod val="20000"/>
+                    <a:lumOff val="80000"/>
+                  </a:schemeClr>
+                </a:solidFill>
+              </a:rPr>
+              <a:t>person_id</a:t>
+            </a:r>
+            <a:r>
+              <a:rPr lang="en-US" sz="1800" dirty="0">
+                <a:solidFill>
+                  <a:schemeClr val="accent1">
+                    <a:lumMod val="20000"/>
+                    <a:lumOff val="80000"/>
+                  </a:schemeClr>
+                </a:solidFill>
+              </a:rPr>
+              <a:t>, position, </a:t>
+            </a:r>
+            <a:r>
+              <a:rPr lang="en-US" sz="1800" dirty="0" err="1">
+                <a:solidFill>
+                  <a:schemeClr val="accent1">
+                    <a:lumMod val="20000"/>
+                    <a:lumOff val="80000"/>
+                  </a:schemeClr>
+                </a:solidFill>
+              </a:rPr>
+              <a:t>is_admin</a:t>
+            </a:r>
+            <a:r>
+              <a:rPr lang="en-US" sz="1800" dirty="0">
+                <a:solidFill>
+                  <a:schemeClr val="accent1">
+                    <a:lumMod val="20000"/>
+                    <a:lumOff val="80000"/>
+                  </a:schemeClr>
+                </a:solidFill>
+              </a:rPr>
+              <a:t>) values </a:t>
+            </a:r>
+          </a:p>
+          <a:p>
+            <a:pPr algn="just"/>
+            <a:r>
+              <a:rPr lang="en-US" sz="1800" dirty="0">
+                <a:solidFill>
+                  <a:schemeClr val="accent1">
+                    <a:lumMod val="20000"/>
+                    <a:lumOff val="80000"/>
+                  </a:schemeClr>
+                </a:solidFill>
+              </a:rPr>
+              <a:t>((select </a:t>
+            </a:r>
+            <a:r>
+              <a:rPr lang="en-US" sz="1800" dirty="0" err="1">
+                <a:solidFill>
+                  <a:schemeClr val="accent1">
+                    <a:lumMod val="20000"/>
+                    <a:lumOff val="80000"/>
+                  </a:schemeClr>
+                </a:solidFill>
+              </a:rPr>
+              <a:t>person_id</a:t>
+            </a:r>
+            <a:r>
+              <a:rPr lang="en-US" sz="1800" dirty="0">
+                <a:solidFill>
+                  <a:schemeClr val="accent1">
+                    <a:lumMod val="20000"/>
+                    <a:lumOff val="80000"/>
+                  </a:schemeClr>
+                </a:solidFill>
+              </a:rPr>
+              <a:t> from person where cell = </a:t>
+            </a:r>
+            <a:r>
+              <a:rPr lang="en-US" sz="1800" dirty="0" err="1">
+                <a:solidFill>
+                  <a:schemeClr val="accent1">
+                    <a:lumMod val="20000"/>
+                    <a:lumOff val="80000"/>
+                  </a:schemeClr>
+                </a:solidFill>
+              </a:rPr>
+              <a:t>cellno</a:t>
+            </a:r>
+            <a:r>
+              <a:rPr lang="en-US" sz="1800" dirty="0">
+                <a:solidFill>
+                  <a:schemeClr val="accent1">
+                    <a:lumMod val="20000"/>
+                    <a:lumOff val="80000"/>
+                  </a:schemeClr>
+                </a:solidFill>
+              </a:rPr>
+              <a:t>), 'Bus Driver', 'N');</a:t>
+            </a:r>
+          </a:p>
+          <a:p>
+            <a:pPr algn="just"/>
+            <a:r>
+              <a:rPr lang="en-US" sz="1800" dirty="0">
+                <a:solidFill>
+                  <a:schemeClr val="accent1">
+                    <a:lumMod val="20000"/>
+                    <a:lumOff val="80000"/>
+                  </a:schemeClr>
+                </a:solidFill>
+              </a:rPr>
+              <a:t>end if;</a:t>
+            </a:r>
+          </a:p>
+          <a:p>
+            <a:pPr algn="just"/>
+            <a:r>
+              <a:rPr lang="en-US" sz="1800" dirty="0">
+                <a:solidFill>
+                  <a:schemeClr val="accent1">
+                    <a:lumMod val="20000"/>
+                    <a:lumOff val="80000"/>
+                  </a:schemeClr>
+                </a:solidFill>
+              </a:rPr>
+              <a:t>END</a:t>
+            </a:r>
+          </a:p>
+          <a:p>
+            <a:pPr algn="just"/>
+            <a:endParaRPr lang="en-US" sz="1800" dirty="0">
+              <a:solidFill>
+                <a:schemeClr val="accent1">
+                  <a:lumMod val="20000"/>
+                  <a:lumOff val="80000"/>
+                </a:schemeClr>
+              </a:solidFill>
+            </a:endParaRPr>
+          </a:p>
+          <a:p>
+            <a:pPr algn="just">
+              <a:spcBef>
+                <a:spcPct val="0"/>
+              </a:spcBef>
+            </a:pPr>
+            <a:r>
+              <a:rPr lang="en-US" sz="1800" spc="-150" dirty="0">
+                <a:ln w="3175">
+                  <a:noFill/>
+                </a:ln>
+                <a:gradFill flip="none" rotWithShape="1">
+                  <a:gsLst>
+                    <a:gs pos="0">
+                      <a:srgbClr val="FFFFB9"/>
+                    </a:gs>
+                    <a:gs pos="36000">
+                      <a:srgbClr val="FFFF99"/>
+                    </a:gs>
+                    <a:gs pos="86000">
+                      <a:srgbClr val="F6AE1E"/>
+                    </a:gs>
+                  </a:gsLst>
+                  <a:lin ang="5400000" scaled="0"/>
+                  <a:tileRect/>
+                </a:gradFill>
+                <a:effectLst>
+                  <a:outerShdw blurRad="50800" dist="38100" dir="2700000" algn="tl" rotWithShape="0">
+                    <a:prstClr val="black">
+                      <a:alpha val="40000"/>
+                    </a:prstClr>
+                  </a:outerShdw>
+                </a:effectLst>
+                <a:latin typeface="+mj-lt"/>
+                <a:cs typeface="Arial" charset="0"/>
+              </a:rPr>
+              <a:t>To  Call  Procedure:</a:t>
+            </a:r>
+          </a:p>
+          <a:p>
+            <a:r>
+              <a:rPr lang="en-US" sz="1800" dirty="0">
+                <a:solidFill>
+                  <a:schemeClr val="accent1">
+                    <a:lumMod val="20000"/>
+                    <a:lumOff val="80000"/>
+                  </a:schemeClr>
+                </a:solidFill>
+              </a:rPr>
+              <a:t>CALL `niner_eats`.`</a:t>
+            </a:r>
+            <a:r>
+              <a:rPr lang="en-US" sz="1800" dirty="0" err="1">
+                <a:solidFill>
+                  <a:schemeClr val="accent1">
+                    <a:lumMod val="20000"/>
+                    <a:lumOff val="80000"/>
+                  </a:schemeClr>
+                </a:solidFill>
+              </a:rPr>
+              <a:t>add_person</a:t>
+            </a:r>
+            <a:r>
+              <a:rPr lang="en-US" sz="1800" dirty="0">
+                <a:solidFill>
+                  <a:schemeClr val="accent1">
+                    <a:lumMod val="20000"/>
+                    <a:lumOff val="80000"/>
+                  </a:schemeClr>
+                </a:solidFill>
+              </a:rPr>
+              <a:t>`('</a:t>
+            </a:r>
+            <a:r>
+              <a:rPr lang="en-US" sz="1800" dirty="0" err="1">
+                <a:solidFill>
+                  <a:schemeClr val="accent1">
+                    <a:lumMod val="20000"/>
+                    <a:lumOff val="80000"/>
+                  </a:schemeClr>
+                </a:solidFill>
+              </a:rPr>
+              <a:t>Akshay</a:t>
+            </a:r>
+            <a:r>
+              <a:rPr lang="en-US" sz="1800" dirty="0">
+                <a:solidFill>
+                  <a:schemeClr val="accent1">
+                    <a:lumMod val="20000"/>
+                    <a:lumOff val="80000"/>
+                  </a:schemeClr>
+                </a:solidFill>
+              </a:rPr>
+              <a:t> Babu', 'ababu1@uncc.edu’,9802820911,'faculty');</a:t>
+            </a:r>
+          </a:p>
+        </p:txBody>
+      </p:sp>
+    </p:spTree>
+    <p:extLst>
+      <p:ext uri="{BB962C8B-B14F-4D97-AF65-F5344CB8AC3E}">
+        <p14:creationId xmlns:p14="http://schemas.microsoft.com/office/powerpoint/2010/main" val="1932914013"/>
+      </p:ext>
+    </p:extLst>
+  </p:cSld>
+  <p:clrMapOvr>
+    <a:masterClrMapping/>
+  </p:clrMapOvr>
+  <p:transition>
+    <p:fade/>
+  </p:transition>
+</p:sld>
+</file>
+
+<file path=ppt/slides/slide13.xml><?xml version="1.0" encoding="utf-8"?>
+<p:sld xmlns:a="http://schemas.openxmlformats.org/drawingml/2006/main" xmlns:r="http://schemas.openxmlformats.org/officeDocument/2006/relationships" xmlns:p="http://schemas.openxmlformats.org/presentationml/2006/main">
+  <p:cSld>
+    <p:spTree>
+      <p:nvGrpSpPr>
+        <p:cNvPr id="1" name=""/>
+        <p:cNvGrpSpPr/>
+        <p:nvPr/>
+      </p:nvGrpSpPr>
+      <p:grpSpPr>
+        <a:xfrm>
+          <a:off x="0" y="0"/>
+          <a:ext cx="0" cy="0"/>
+          <a:chOff x="0" y="0"/>
+          <a:chExt cx="0" cy="0"/>
+        </a:xfrm>
+      </p:grpSpPr>
+      <p:pic>
+        <p:nvPicPr>
+          <p:cNvPr id="5" name="Picture 4">
+            <a:extLst>
+              <a:ext uri="{FF2B5EF4-FFF2-40B4-BE49-F238E27FC236}">
+                <a16:creationId xmlns:a16="http://schemas.microsoft.com/office/drawing/2014/main" id="{494F2741-966C-44F7-9D52-229AEFFD676C}"/>
+              </a:ext>
+            </a:extLst>
+          </p:cNvPr>
+          <p:cNvPicPr>
+            <a:picLocks noChangeAspect="1"/>
+          </p:cNvPicPr>
+          <p:nvPr/>
+        </p:nvPicPr>
+        <p:blipFill>
+          <a:blip r:embed="rId2"/>
+          <a:stretch>
+            <a:fillRect/>
+          </a:stretch>
+        </p:blipFill>
+        <p:spPr>
+          <a:xfrm>
+            <a:off x="76200" y="609601"/>
+            <a:ext cx="8915400" cy="4860832"/>
+          </a:xfrm>
+          <a:prstGeom prst="rect">
+            <a:avLst/>
+          </a:prstGeom>
+        </p:spPr>
+      </p:pic>
+    </p:spTree>
+    <p:extLst>
+      <p:ext uri="{BB962C8B-B14F-4D97-AF65-F5344CB8AC3E}">
+        <p14:creationId xmlns:p14="http://schemas.microsoft.com/office/powerpoint/2010/main" val="1059728830"/>
+      </p:ext>
+    </p:extLst>
+  </p:cSld>
+  <p:clrMapOvr>
+    <a:masterClrMapping/>
+  </p:clrMapOvr>
+  <p:transition>
+    <p:fade/>
+  </p:transition>
+</p:sld>
+</file>
+
+<file path=ppt/slides/slide14.xml><?xml version="1.0" encoding="utf-8"?>
+<p:sld xmlns:a="http://schemas.openxmlformats.org/drawingml/2006/main" xmlns:r="http://schemas.openxmlformats.org/officeDocument/2006/relationships" xmlns:p="http://schemas.openxmlformats.org/presentationml/2006/main">
+  <p:cSld>
+    <p:spTree>
+      <p:nvGrpSpPr>
+        <p:cNvPr id="1" name=""/>
+        <p:cNvGrpSpPr/>
+        <p:nvPr/>
+      </p:nvGrpSpPr>
+      <p:grpSpPr>
+        <a:xfrm>
+          <a:off x="0" y="0"/>
+          <a:ext cx="0" cy="0"/>
+          <a:chOff x="0" y="0"/>
+          <a:chExt cx="0" cy="0"/>
+        </a:xfrm>
+      </p:grpSpPr>
+      <p:sp>
+        <p:nvSpPr>
+          <p:cNvPr id="2" name="Title 1">
+            <a:extLst>
+              <a:ext uri="{FF2B5EF4-FFF2-40B4-BE49-F238E27FC236}">
+                <a16:creationId xmlns:a16="http://schemas.microsoft.com/office/drawing/2014/main" id="{F2482796-59A3-483E-832F-5F1E3CDDCA29}"/>
+              </a:ext>
+            </a:extLst>
+          </p:cNvPr>
+          <p:cNvSpPr>
+            <a:spLocks noGrp="1"/>
+          </p:cNvSpPr>
+          <p:nvPr>
+            <p:ph type="ctrTitle"/>
+          </p:nvPr>
+        </p:nvSpPr>
+        <p:spPr>
+          <a:xfrm>
+            <a:off x="914400" y="457200"/>
+            <a:ext cx="7043208" cy="112195"/>
+          </a:xfrm>
+        </p:spPr>
+        <p:txBody>
+          <a:bodyPr/>
+          <a:lstStyle/>
+          <a:p>
+            <a:pPr algn="ctr"/>
+            <a:r>
+              <a:rPr lang="en-US" dirty="0"/>
+              <a:t>Trigger</a:t>
+            </a:r>
+          </a:p>
+        </p:txBody>
+      </p:sp>
+      <p:sp>
+        <p:nvSpPr>
+          <p:cNvPr id="3" name="Subtitle 2">
+            <a:extLst>
+              <a:ext uri="{FF2B5EF4-FFF2-40B4-BE49-F238E27FC236}">
+                <a16:creationId xmlns:a16="http://schemas.microsoft.com/office/drawing/2014/main" id="{46B027EF-284E-472C-9732-AAB523D83E71}"/>
+              </a:ext>
+            </a:extLst>
+          </p:cNvPr>
+          <p:cNvSpPr>
+            <a:spLocks noGrp="1"/>
+          </p:cNvSpPr>
+          <p:nvPr>
+            <p:ph type="subTitle" idx="1"/>
+          </p:nvPr>
+        </p:nvSpPr>
+        <p:spPr>
+          <a:xfrm>
+            <a:off x="381000" y="990600"/>
+            <a:ext cx="8382000" cy="461665"/>
+          </a:xfrm>
+        </p:spPr>
+        <p:txBody>
+          <a:bodyPr/>
+          <a:lstStyle/>
+          <a:p>
+            <a:r>
+              <a:rPr lang="en-US" sz="1800" dirty="0"/>
+              <a:t>The below trigger populates value in delivery table as soon as a new record is created in order table.</a:t>
+            </a:r>
+          </a:p>
+          <a:p>
+            <a:endParaRPr lang="en-US" sz="1800" dirty="0"/>
+          </a:p>
+          <a:p>
+            <a:r>
+              <a:rPr lang="en-US" sz="1800" dirty="0">
+                <a:solidFill>
+                  <a:schemeClr val="accent1">
+                    <a:lumMod val="20000"/>
+                    <a:lumOff val="80000"/>
+                  </a:schemeClr>
+                </a:solidFill>
+              </a:rPr>
+              <a:t>CREATE DEFINER=`</a:t>
+            </a:r>
+            <a:r>
+              <a:rPr lang="en-US" sz="1800" dirty="0" err="1">
+                <a:solidFill>
+                  <a:schemeClr val="accent1">
+                    <a:lumMod val="20000"/>
+                    <a:lumOff val="80000"/>
+                  </a:schemeClr>
+                </a:solidFill>
+              </a:rPr>
+              <a:t>root`@`localhost</a:t>
+            </a:r>
+            <a:r>
+              <a:rPr lang="en-US" sz="1800" dirty="0">
+                <a:solidFill>
+                  <a:schemeClr val="accent1">
+                    <a:lumMod val="20000"/>
+                    <a:lumOff val="80000"/>
+                  </a:schemeClr>
+                </a:solidFill>
+              </a:rPr>
+              <a:t>` TRIGGER `</a:t>
+            </a:r>
+            <a:r>
+              <a:rPr lang="en-US" sz="1800" dirty="0" err="1">
+                <a:solidFill>
+                  <a:schemeClr val="accent1">
+                    <a:lumMod val="20000"/>
+                    <a:lumOff val="80000"/>
+                  </a:schemeClr>
+                </a:solidFill>
+              </a:rPr>
+              <a:t>order_AFTER_INSERT</a:t>
+            </a:r>
+            <a:r>
+              <a:rPr lang="en-US" sz="1800" dirty="0">
+                <a:solidFill>
+                  <a:schemeClr val="accent1">
+                    <a:lumMod val="20000"/>
+                    <a:lumOff val="80000"/>
+                  </a:schemeClr>
+                </a:solidFill>
+              </a:rPr>
+              <a:t>` AFTER INSERT ON `order` FOR EACH ROW BEGIN</a:t>
+            </a:r>
+          </a:p>
+          <a:p>
+            <a:r>
+              <a:rPr lang="en-US" sz="1800" dirty="0">
+                <a:solidFill>
+                  <a:schemeClr val="accent1">
+                    <a:lumMod val="20000"/>
+                    <a:lumOff val="80000"/>
+                  </a:schemeClr>
+                </a:solidFill>
+              </a:rPr>
+              <a:t>	insert into </a:t>
+            </a:r>
+            <a:r>
+              <a:rPr lang="en-US" sz="1800" dirty="0" err="1">
+                <a:solidFill>
+                  <a:schemeClr val="accent1">
+                    <a:lumMod val="20000"/>
+                    <a:lumOff val="80000"/>
+                  </a:schemeClr>
+                </a:solidFill>
+              </a:rPr>
+              <a:t>niner_eats.delivery</a:t>
+            </a:r>
+            <a:r>
+              <a:rPr lang="en-US" sz="1800" dirty="0">
+                <a:solidFill>
+                  <a:schemeClr val="accent1">
+                    <a:lumMod val="20000"/>
+                    <a:lumOff val="80000"/>
+                  </a:schemeClr>
+                </a:solidFill>
+              </a:rPr>
+              <a:t> (</a:t>
+            </a:r>
+            <a:r>
+              <a:rPr lang="en-US" sz="1800" dirty="0" err="1">
+                <a:solidFill>
+                  <a:schemeClr val="accent1">
+                    <a:lumMod val="20000"/>
+                    <a:lumOff val="80000"/>
+                  </a:schemeClr>
+                </a:solidFill>
+              </a:rPr>
+              <a:t>driver_id</a:t>
+            </a:r>
+            <a:r>
+              <a:rPr lang="en-US" sz="1800" dirty="0">
+                <a:solidFill>
+                  <a:schemeClr val="accent1">
+                    <a:lumMod val="20000"/>
+                    <a:lumOff val="80000"/>
+                  </a:schemeClr>
+                </a:solidFill>
+              </a:rPr>
+              <a:t>, </a:t>
+            </a:r>
+            <a:r>
+              <a:rPr lang="en-US" sz="1800" dirty="0" err="1">
+                <a:solidFill>
+                  <a:schemeClr val="accent1">
+                    <a:lumMod val="20000"/>
+                    <a:lumOff val="80000"/>
+                  </a:schemeClr>
+                </a:solidFill>
+              </a:rPr>
+              <a:t>vehicle_id</a:t>
+            </a:r>
+            <a:r>
+              <a:rPr lang="en-US" sz="1800" dirty="0">
+                <a:solidFill>
+                  <a:schemeClr val="accent1">
+                    <a:lumMod val="20000"/>
+                    <a:lumOff val="80000"/>
+                  </a:schemeClr>
+                </a:solidFill>
+              </a:rPr>
+              <a:t>) values(</a:t>
+            </a:r>
+            <a:r>
+              <a:rPr lang="en-US" sz="1800" dirty="0" err="1">
+                <a:solidFill>
+                  <a:schemeClr val="accent1">
+                    <a:lumMod val="20000"/>
+                    <a:lumOff val="80000"/>
+                  </a:schemeClr>
+                </a:solidFill>
+              </a:rPr>
+              <a:t>new.driver_id</a:t>
+            </a:r>
+            <a:r>
+              <a:rPr lang="en-US" sz="1800" dirty="0">
+                <a:solidFill>
+                  <a:schemeClr val="accent1">
+                    <a:lumMod val="20000"/>
+                    <a:lumOff val="80000"/>
+                  </a:schemeClr>
+                </a:solidFill>
+              </a:rPr>
+              <a:t>, 2);</a:t>
+            </a:r>
+          </a:p>
+          <a:p>
+            <a:r>
+              <a:rPr lang="en-US" sz="1800" dirty="0">
+                <a:solidFill>
+                  <a:schemeClr val="accent1">
+                    <a:lumMod val="20000"/>
+                    <a:lumOff val="80000"/>
+                  </a:schemeClr>
+                </a:solidFill>
+              </a:rPr>
+              <a:t>END</a:t>
+            </a:r>
+          </a:p>
+          <a:p>
+            <a:endParaRPr lang="en-US" sz="1800" dirty="0">
+              <a:solidFill>
+                <a:schemeClr val="accent1">
+                  <a:lumMod val="20000"/>
+                  <a:lumOff val="80000"/>
+                </a:schemeClr>
+              </a:solidFill>
+            </a:endParaRPr>
+          </a:p>
+          <a:p>
+            <a:endParaRPr lang="en-US" sz="1800" dirty="0">
+              <a:solidFill>
+                <a:schemeClr val="accent1">
+                  <a:lumMod val="20000"/>
+                  <a:lumOff val="80000"/>
+                </a:schemeClr>
+              </a:solidFill>
+            </a:endParaRPr>
+          </a:p>
+          <a:p>
+            <a:endParaRPr lang="en-US" sz="1800" dirty="0"/>
+          </a:p>
+        </p:txBody>
+      </p:sp>
+      <p:pic>
+        <p:nvPicPr>
+          <p:cNvPr id="6" name="Picture 5">
+            <a:extLst>
+              <a:ext uri="{FF2B5EF4-FFF2-40B4-BE49-F238E27FC236}">
+                <a16:creationId xmlns:a16="http://schemas.microsoft.com/office/drawing/2014/main" id="{EBFD12E5-189E-4090-B2CD-AD87AA324F9C}"/>
+              </a:ext>
+            </a:extLst>
+          </p:cNvPr>
+          <p:cNvPicPr>
+            <a:picLocks noChangeAspect="1"/>
+          </p:cNvPicPr>
+          <p:nvPr/>
+        </p:nvPicPr>
+        <p:blipFill>
+          <a:blip r:embed="rId2"/>
+          <a:stretch>
+            <a:fillRect/>
+          </a:stretch>
+        </p:blipFill>
+        <p:spPr>
+          <a:xfrm>
+            <a:off x="56561" y="2743201"/>
+            <a:ext cx="9011239" cy="3124200"/>
+          </a:xfrm>
+          <a:prstGeom prst="rect">
+            <a:avLst/>
+          </a:prstGeom>
+        </p:spPr>
+      </p:pic>
+    </p:spTree>
+    <p:extLst>
+      <p:ext uri="{BB962C8B-B14F-4D97-AF65-F5344CB8AC3E}">
+        <p14:creationId xmlns:p14="http://schemas.microsoft.com/office/powerpoint/2010/main" val="2294823439"/>
+      </p:ext>
+    </p:extLst>
+  </p:cSld>
+  <p:clrMapOvr>
+    <a:masterClrMapping/>
+  </p:clrMapOvr>
+  <p:transition>
+    <p:fade/>
+  </p:transition>
+</p:sld>
+</file>
+
+<file path=ppt/slides/slide15.xml><?xml version="1.0" encoding="utf-8"?>
+<p:sld xmlns:a="http://schemas.openxmlformats.org/drawingml/2006/main" xmlns:r="http://schemas.openxmlformats.org/officeDocument/2006/relationships" xmlns:p="http://schemas.openxmlformats.org/presentationml/2006/main">
+  <p:cSld>
+    <p:spTree>
+      <p:nvGrpSpPr>
+        <p:cNvPr id="1" name=""/>
+        <p:cNvGrpSpPr/>
+        <p:nvPr/>
+      </p:nvGrpSpPr>
+      <p:grpSpPr>
+        <a:xfrm>
+          <a:off x="0" y="0"/>
+          <a:ext cx="0" cy="0"/>
+          <a:chOff x="0" y="0"/>
+          <a:chExt cx="0" cy="0"/>
+        </a:xfrm>
+      </p:grpSpPr>
+      <p:sp>
+        <p:nvSpPr>
+          <p:cNvPr id="2" name="Title 1">
+            <a:extLst>
+              <a:ext uri="{FF2B5EF4-FFF2-40B4-BE49-F238E27FC236}">
+                <a16:creationId xmlns:a16="http://schemas.microsoft.com/office/drawing/2014/main" id="{0A3FD2DE-881F-43F0-A026-2CCD86F4A93D}"/>
+              </a:ext>
+            </a:extLst>
+          </p:cNvPr>
+          <p:cNvSpPr>
+            <a:spLocks noGrp="1"/>
+          </p:cNvSpPr>
+          <p:nvPr>
+            <p:ph type="ctrTitle"/>
+          </p:nvPr>
+        </p:nvSpPr>
+        <p:spPr>
+          <a:xfrm>
+            <a:off x="1219200" y="12569"/>
+            <a:ext cx="7043208" cy="1054231"/>
+          </a:xfrm>
+        </p:spPr>
+        <p:txBody>
+          <a:bodyPr/>
+          <a:lstStyle/>
+          <a:p>
+            <a:pPr algn="ctr"/>
+            <a:r>
+              <a:rPr lang="en-US" dirty="0"/>
+              <a:t>View #1</a:t>
+            </a:r>
+          </a:p>
+        </p:txBody>
+      </p:sp>
+      <p:sp>
+        <p:nvSpPr>
+          <p:cNvPr id="3" name="Subtitle 2">
+            <a:extLst>
+              <a:ext uri="{FF2B5EF4-FFF2-40B4-BE49-F238E27FC236}">
+                <a16:creationId xmlns:a16="http://schemas.microsoft.com/office/drawing/2014/main" id="{1D28907F-CE03-4FFD-996F-E78B0891DA45}"/>
+              </a:ext>
+            </a:extLst>
+          </p:cNvPr>
+          <p:cNvSpPr>
+            <a:spLocks noGrp="1"/>
+          </p:cNvSpPr>
+          <p:nvPr>
+            <p:ph type="subTitle" idx="1"/>
+          </p:nvPr>
+        </p:nvSpPr>
+        <p:spPr>
+          <a:xfrm>
+            <a:off x="990600" y="990600"/>
+            <a:ext cx="7696200" cy="3816053"/>
+          </a:xfrm>
+        </p:spPr>
+        <p:txBody>
+          <a:bodyPr/>
+          <a:lstStyle/>
+          <a:p>
+            <a:r>
+              <a:rPr lang="en-US" sz="1800" dirty="0"/>
+              <a:t>The below view </a:t>
+            </a:r>
+            <a:r>
+              <a:rPr lang="en-US" sz="1800" dirty="0" err="1"/>
+              <a:t>person_join</a:t>
+            </a:r>
+            <a:r>
+              <a:rPr lang="en-US" sz="1800" dirty="0"/>
+              <a:t> will contain names of students and their details whose major is Computer Science.</a:t>
+            </a:r>
+          </a:p>
+          <a:p>
+            <a:endParaRPr lang="en-US" sz="1800" dirty="0"/>
+          </a:p>
+          <a:p>
+            <a:r>
+              <a:rPr lang="en-US" sz="1800" dirty="0">
+                <a:solidFill>
+                  <a:schemeClr val="accent1">
+                    <a:lumMod val="20000"/>
+                    <a:lumOff val="80000"/>
+                  </a:schemeClr>
+                </a:solidFill>
+              </a:rPr>
+              <a:t>CREATE </a:t>
+            </a:r>
+          </a:p>
+          <a:p>
+            <a:r>
+              <a:rPr lang="en-US" sz="1800" dirty="0">
+                <a:solidFill>
+                  <a:schemeClr val="accent1">
+                    <a:lumMod val="20000"/>
+                    <a:lumOff val="80000"/>
+                  </a:schemeClr>
+                </a:solidFill>
+              </a:rPr>
+              <a:t>    ALGORITHM = UNDEFINED </a:t>
+            </a:r>
+          </a:p>
+          <a:p>
+            <a:r>
+              <a:rPr lang="en-US" sz="1800" dirty="0">
+                <a:solidFill>
+                  <a:schemeClr val="accent1">
+                    <a:lumMod val="20000"/>
+                    <a:lumOff val="80000"/>
+                  </a:schemeClr>
+                </a:solidFill>
+              </a:rPr>
+              <a:t>    DEFINER = `</a:t>
+            </a:r>
+            <a:r>
+              <a:rPr lang="en-US" sz="1800" dirty="0" err="1">
+                <a:solidFill>
+                  <a:schemeClr val="accent1">
+                    <a:lumMod val="20000"/>
+                    <a:lumOff val="80000"/>
+                  </a:schemeClr>
+                </a:solidFill>
+              </a:rPr>
+              <a:t>root`@`localhost</a:t>
+            </a:r>
+            <a:r>
+              <a:rPr lang="en-US" sz="1800" dirty="0">
+                <a:solidFill>
+                  <a:schemeClr val="accent1">
+                    <a:lumMod val="20000"/>
+                    <a:lumOff val="80000"/>
+                  </a:schemeClr>
+                </a:solidFill>
+              </a:rPr>
+              <a:t>` </a:t>
+            </a:r>
+          </a:p>
+          <a:p>
+            <a:r>
+              <a:rPr lang="en-US" sz="1800" dirty="0">
+                <a:solidFill>
+                  <a:schemeClr val="accent1">
+                    <a:lumMod val="20000"/>
+                    <a:lumOff val="80000"/>
+                  </a:schemeClr>
+                </a:solidFill>
+              </a:rPr>
+              <a:t>    SQL SECURITY DEFINER</a:t>
+            </a:r>
+          </a:p>
+          <a:p>
+            <a:r>
+              <a:rPr lang="en-US" sz="1800" dirty="0">
+                <a:solidFill>
+                  <a:schemeClr val="accent1">
+                    <a:lumMod val="20000"/>
+                    <a:lumOff val="80000"/>
+                  </a:schemeClr>
+                </a:solidFill>
+              </a:rPr>
+              <a:t>VIEW `niner_eats`.`</a:t>
+            </a:r>
+            <a:r>
+              <a:rPr lang="en-US" sz="1800" dirty="0" err="1">
+                <a:solidFill>
+                  <a:schemeClr val="accent1">
+                    <a:lumMod val="20000"/>
+                    <a:lumOff val="80000"/>
+                  </a:schemeClr>
+                </a:solidFill>
+              </a:rPr>
+              <a:t>person_join</a:t>
+            </a:r>
+            <a:r>
+              <a:rPr lang="en-US" sz="1800" dirty="0">
+                <a:solidFill>
+                  <a:schemeClr val="accent1">
+                    <a:lumMod val="20000"/>
+                    <a:lumOff val="80000"/>
+                  </a:schemeClr>
+                </a:solidFill>
+              </a:rPr>
+              <a:t>` AS</a:t>
+            </a:r>
+          </a:p>
+          <a:p>
+            <a:r>
+              <a:rPr lang="en-US" sz="1800" dirty="0">
+                <a:solidFill>
+                  <a:schemeClr val="accent1">
+                    <a:lumMod val="20000"/>
+                    <a:lumOff val="80000"/>
+                  </a:schemeClr>
+                </a:solidFill>
+              </a:rPr>
+              <a:t>    SELECT </a:t>
+            </a:r>
+          </a:p>
+          <a:p>
+            <a:r>
+              <a:rPr lang="en-US" sz="1800" dirty="0">
+                <a:solidFill>
+                  <a:schemeClr val="accent1">
+                    <a:lumMod val="20000"/>
+                    <a:lumOff val="80000"/>
+                  </a:schemeClr>
+                </a:solidFill>
+              </a:rPr>
+              <a:t>        `niner_eats`.`person`.`</a:t>
+            </a:r>
+            <a:r>
+              <a:rPr lang="en-US" sz="1800" dirty="0" err="1">
+                <a:solidFill>
+                  <a:schemeClr val="accent1">
+                    <a:lumMod val="20000"/>
+                    <a:lumOff val="80000"/>
+                  </a:schemeClr>
+                </a:solidFill>
+              </a:rPr>
+              <a:t>person_id</a:t>
+            </a:r>
+            <a:r>
+              <a:rPr lang="en-US" sz="1800" dirty="0">
+                <a:solidFill>
+                  <a:schemeClr val="accent1">
+                    <a:lumMod val="20000"/>
+                    <a:lumOff val="80000"/>
+                  </a:schemeClr>
+                </a:solidFill>
+              </a:rPr>
+              <a:t>` AS `</a:t>
+            </a:r>
+            <a:r>
+              <a:rPr lang="en-US" sz="1800" dirty="0" err="1">
+                <a:solidFill>
+                  <a:schemeClr val="accent1">
+                    <a:lumMod val="20000"/>
+                    <a:lumOff val="80000"/>
+                  </a:schemeClr>
+                </a:solidFill>
+              </a:rPr>
+              <a:t>person_id</a:t>
+            </a:r>
+            <a:r>
+              <a:rPr lang="en-US" sz="1800" dirty="0">
+                <a:solidFill>
+                  <a:schemeClr val="accent1">
+                    <a:lumMod val="20000"/>
+                    <a:lumOff val="80000"/>
+                  </a:schemeClr>
+                </a:solidFill>
+              </a:rPr>
+              <a:t>`,</a:t>
+            </a:r>
+          </a:p>
+          <a:p>
+            <a:r>
+              <a:rPr lang="en-US" sz="1800" dirty="0">
+                <a:solidFill>
+                  <a:schemeClr val="accent1">
+                    <a:lumMod val="20000"/>
+                    <a:lumOff val="80000"/>
+                  </a:schemeClr>
+                </a:solidFill>
+              </a:rPr>
+              <a:t>        `niner_eats`.`person`.`</a:t>
+            </a:r>
+            <a:r>
+              <a:rPr lang="en-US" sz="1800" dirty="0" err="1">
+                <a:solidFill>
+                  <a:schemeClr val="accent1">
+                    <a:lumMod val="20000"/>
+                    <a:lumOff val="80000"/>
+                  </a:schemeClr>
+                </a:solidFill>
+              </a:rPr>
+              <a:t>person_name</a:t>
+            </a:r>
+            <a:r>
+              <a:rPr lang="en-US" sz="1800" dirty="0">
+                <a:solidFill>
+                  <a:schemeClr val="accent1">
+                    <a:lumMod val="20000"/>
+                    <a:lumOff val="80000"/>
+                  </a:schemeClr>
+                </a:solidFill>
+              </a:rPr>
+              <a:t>` AS `</a:t>
+            </a:r>
+            <a:r>
+              <a:rPr lang="en-US" sz="1800" dirty="0" err="1">
+                <a:solidFill>
+                  <a:schemeClr val="accent1">
+                    <a:lumMod val="20000"/>
+                    <a:lumOff val="80000"/>
+                  </a:schemeClr>
+                </a:solidFill>
+              </a:rPr>
+              <a:t>person_name</a:t>
+            </a:r>
+            <a:r>
+              <a:rPr lang="en-US" sz="1800" dirty="0">
+                <a:solidFill>
+                  <a:schemeClr val="accent1">
+                    <a:lumMod val="20000"/>
+                    <a:lumOff val="80000"/>
+                  </a:schemeClr>
+                </a:solidFill>
+              </a:rPr>
+              <a:t>`,</a:t>
+            </a:r>
+          </a:p>
+          <a:p>
+            <a:r>
+              <a:rPr lang="en-US" sz="1800" dirty="0">
+                <a:solidFill>
+                  <a:schemeClr val="accent1">
+                    <a:lumMod val="20000"/>
+                    <a:lumOff val="80000"/>
+                  </a:schemeClr>
+                </a:solidFill>
+              </a:rPr>
+              <a:t>        `niner_eats`.`person`.`</a:t>
+            </a:r>
+            <a:r>
+              <a:rPr lang="en-US" sz="1800" dirty="0" err="1">
+                <a:solidFill>
+                  <a:schemeClr val="accent1">
+                    <a:lumMod val="20000"/>
+                    <a:lumOff val="80000"/>
+                  </a:schemeClr>
+                </a:solidFill>
+              </a:rPr>
+              <a:t>person_email</a:t>
+            </a:r>
+            <a:r>
+              <a:rPr lang="en-US" sz="1800" dirty="0">
+                <a:solidFill>
+                  <a:schemeClr val="accent1">
+                    <a:lumMod val="20000"/>
+                    <a:lumOff val="80000"/>
+                  </a:schemeClr>
+                </a:solidFill>
+              </a:rPr>
+              <a:t>` AS `</a:t>
+            </a:r>
+            <a:r>
+              <a:rPr lang="en-US" sz="1800" dirty="0" err="1">
+                <a:solidFill>
+                  <a:schemeClr val="accent1">
+                    <a:lumMod val="20000"/>
+                    <a:lumOff val="80000"/>
+                  </a:schemeClr>
+                </a:solidFill>
+              </a:rPr>
+              <a:t>person_email</a:t>
+            </a:r>
+            <a:r>
+              <a:rPr lang="en-US" sz="1800" dirty="0">
+                <a:solidFill>
+                  <a:schemeClr val="accent1">
+                    <a:lumMod val="20000"/>
+                    <a:lumOff val="80000"/>
+                  </a:schemeClr>
+                </a:solidFill>
+              </a:rPr>
+              <a:t>`,</a:t>
+            </a:r>
+          </a:p>
+          <a:p>
+            <a:r>
+              <a:rPr lang="en-US" sz="1800" dirty="0">
+                <a:solidFill>
+                  <a:schemeClr val="accent1">
+                    <a:lumMod val="20000"/>
+                    <a:lumOff val="80000"/>
+                  </a:schemeClr>
+                </a:solidFill>
+              </a:rPr>
+              <a:t>        `niner_eats`.`student`.`</a:t>
+            </a:r>
+            <a:r>
+              <a:rPr lang="en-US" sz="1800" dirty="0" err="1">
+                <a:solidFill>
+                  <a:schemeClr val="accent1">
+                    <a:lumMod val="20000"/>
+                    <a:lumOff val="80000"/>
+                  </a:schemeClr>
+                </a:solidFill>
+              </a:rPr>
+              <a:t>student_id</a:t>
+            </a:r>
+            <a:r>
+              <a:rPr lang="en-US" sz="1800" dirty="0">
+                <a:solidFill>
+                  <a:schemeClr val="accent1">
+                    <a:lumMod val="20000"/>
+                    <a:lumOff val="80000"/>
+                  </a:schemeClr>
+                </a:solidFill>
+              </a:rPr>
+              <a:t>` AS `</a:t>
+            </a:r>
+            <a:r>
+              <a:rPr lang="en-US" sz="1800" dirty="0" err="1">
+                <a:solidFill>
+                  <a:schemeClr val="accent1">
+                    <a:lumMod val="20000"/>
+                    <a:lumOff val="80000"/>
+                  </a:schemeClr>
+                </a:solidFill>
+              </a:rPr>
+              <a:t>student_id</a:t>
+            </a:r>
+            <a:r>
+              <a:rPr lang="en-US" sz="1800" dirty="0">
+                <a:solidFill>
+                  <a:schemeClr val="accent1">
+                    <a:lumMod val="20000"/>
+                    <a:lumOff val="80000"/>
+                  </a:schemeClr>
+                </a:solidFill>
+              </a:rPr>
+              <a:t>`,</a:t>
+            </a:r>
+          </a:p>
+          <a:p>
+            <a:r>
+              <a:rPr lang="en-US" sz="1800" dirty="0">
+                <a:solidFill>
+                  <a:schemeClr val="accent1">
+                    <a:lumMod val="20000"/>
+                    <a:lumOff val="80000"/>
+                  </a:schemeClr>
+                </a:solidFill>
+              </a:rPr>
+              <a:t>        `niner_eats`.`student`.`</a:t>
+            </a:r>
+            <a:r>
+              <a:rPr lang="en-US" sz="1800" dirty="0" err="1">
+                <a:solidFill>
+                  <a:schemeClr val="accent1">
+                    <a:lumMod val="20000"/>
+                    <a:lumOff val="80000"/>
+                  </a:schemeClr>
+                </a:solidFill>
+              </a:rPr>
+              <a:t>graduation_year</a:t>
+            </a:r>
+            <a:r>
+              <a:rPr lang="en-US" sz="1800" dirty="0">
+                <a:solidFill>
+                  <a:schemeClr val="accent1">
+                    <a:lumMod val="20000"/>
+                    <a:lumOff val="80000"/>
+                  </a:schemeClr>
+                </a:solidFill>
+              </a:rPr>
+              <a:t>` AS `</a:t>
+            </a:r>
+            <a:r>
+              <a:rPr lang="en-US" sz="1800" dirty="0" err="1">
+                <a:solidFill>
+                  <a:schemeClr val="accent1">
+                    <a:lumMod val="20000"/>
+                    <a:lumOff val="80000"/>
+                  </a:schemeClr>
+                </a:solidFill>
+              </a:rPr>
+              <a:t>graduation_year</a:t>
+            </a:r>
+            <a:r>
+              <a:rPr lang="en-US" sz="1800" dirty="0">
+                <a:solidFill>
+                  <a:schemeClr val="accent1">
+                    <a:lumMod val="20000"/>
+                    <a:lumOff val="80000"/>
+                  </a:schemeClr>
+                </a:solidFill>
+              </a:rPr>
+              <a:t>`</a:t>
+            </a:r>
+          </a:p>
+          <a:p>
+            <a:r>
+              <a:rPr lang="en-US" sz="1800" dirty="0">
+                <a:solidFill>
+                  <a:schemeClr val="accent1">
+                    <a:lumMod val="20000"/>
+                    <a:lumOff val="80000"/>
+                  </a:schemeClr>
+                </a:solidFill>
+              </a:rPr>
+              <a:t>    FROM</a:t>
+            </a:r>
+          </a:p>
+          <a:p>
+            <a:r>
+              <a:rPr lang="en-US" sz="1800" dirty="0">
+                <a:solidFill>
+                  <a:schemeClr val="accent1">
+                    <a:lumMod val="20000"/>
+                    <a:lumOff val="80000"/>
+                  </a:schemeClr>
+                </a:solidFill>
+              </a:rPr>
+              <a:t>        (`</a:t>
+            </a:r>
+            <a:r>
+              <a:rPr lang="en-US" sz="1800" dirty="0" err="1">
+                <a:solidFill>
+                  <a:schemeClr val="accent1">
+                    <a:lumMod val="20000"/>
+                    <a:lumOff val="80000"/>
+                  </a:schemeClr>
+                </a:solidFill>
+              </a:rPr>
+              <a:t>niner_eats`.`person</a:t>
+            </a:r>
+            <a:r>
+              <a:rPr lang="en-US" sz="1800" dirty="0">
+                <a:solidFill>
+                  <a:schemeClr val="accent1">
+                    <a:lumMod val="20000"/>
+                    <a:lumOff val="80000"/>
+                  </a:schemeClr>
+                </a:solidFill>
+              </a:rPr>
+              <a:t>`</a:t>
+            </a:r>
+          </a:p>
+          <a:p>
+            <a:r>
+              <a:rPr lang="en-US" sz="1800" dirty="0">
+                <a:solidFill>
+                  <a:schemeClr val="accent1">
+                    <a:lumMod val="20000"/>
+                    <a:lumOff val="80000"/>
+                  </a:schemeClr>
+                </a:solidFill>
+              </a:rPr>
+              <a:t>        JOIN `</a:t>
+            </a:r>
+            <a:r>
+              <a:rPr lang="en-US" sz="1800" dirty="0" err="1">
+                <a:solidFill>
+                  <a:schemeClr val="accent1">
+                    <a:lumMod val="20000"/>
+                    <a:lumOff val="80000"/>
+                  </a:schemeClr>
+                </a:solidFill>
+              </a:rPr>
+              <a:t>niner_eats`.`student</a:t>
+            </a:r>
+            <a:r>
+              <a:rPr lang="en-US" sz="1800" dirty="0">
+                <a:solidFill>
+                  <a:schemeClr val="accent1">
+                    <a:lumMod val="20000"/>
+                    <a:lumOff val="80000"/>
+                  </a:schemeClr>
+                </a:solidFill>
+              </a:rPr>
+              <a:t>` ON ((`niner_eats`.`student`.`</a:t>
+            </a:r>
+            <a:r>
+              <a:rPr lang="en-US" sz="1800" dirty="0" err="1">
+                <a:solidFill>
+                  <a:schemeClr val="accent1">
+                    <a:lumMod val="20000"/>
+                    <a:lumOff val="80000"/>
+                  </a:schemeClr>
+                </a:solidFill>
+              </a:rPr>
+              <a:t>person_id</a:t>
+            </a:r>
+            <a:r>
+              <a:rPr lang="en-US" sz="1800" dirty="0">
+                <a:solidFill>
+                  <a:schemeClr val="accent1">
+                    <a:lumMod val="20000"/>
+                    <a:lumOff val="80000"/>
+                  </a:schemeClr>
+                </a:solidFill>
+              </a:rPr>
+              <a:t>` = `niner_eats`.`person`.`</a:t>
+            </a:r>
+            <a:r>
+              <a:rPr lang="en-US" sz="1800" dirty="0" err="1">
+                <a:solidFill>
+                  <a:schemeClr val="accent1">
+                    <a:lumMod val="20000"/>
+                    <a:lumOff val="80000"/>
+                  </a:schemeClr>
+                </a:solidFill>
+              </a:rPr>
+              <a:t>person_id</a:t>
+            </a:r>
+            <a:r>
+              <a:rPr lang="en-US" sz="1800" dirty="0">
+                <a:solidFill>
+                  <a:schemeClr val="accent1">
+                    <a:lumMod val="20000"/>
+                    <a:lumOff val="80000"/>
+                  </a:schemeClr>
+                </a:solidFill>
+              </a:rPr>
+              <a:t>`)))</a:t>
+            </a:r>
+          </a:p>
+          <a:p>
+            <a:r>
+              <a:rPr lang="en-US" sz="1800" dirty="0">
+                <a:solidFill>
+                  <a:schemeClr val="accent1">
+                    <a:lumMod val="20000"/>
+                    <a:lumOff val="80000"/>
+                  </a:schemeClr>
+                </a:solidFill>
+              </a:rPr>
+              <a:t>    WHERE</a:t>
+            </a:r>
+          </a:p>
+          <a:p>
+            <a:r>
+              <a:rPr lang="en-US" sz="1800" dirty="0">
+                <a:solidFill>
+                  <a:schemeClr val="accent1">
+                    <a:lumMod val="20000"/>
+                    <a:lumOff val="80000"/>
+                  </a:schemeClr>
+                </a:solidFill>
+              </a:rPr>
+              <a:t>        (`</a:t>
+            </a:r>
+            <a:r>
+              <a:rPr lang="en-US" sz="1800" dirty="0" err="1">
+                <a:solidFill>
+                  <a:schemeClr val="accent1">
+                    <a:lumMod val="20000"/>
+                    <a:lumOff val="80000"/>
+                  </a:schemeClr>
+                </a:solidFill>
+              </a:rPr>
+              <a:t>niner_eats`.`student`.`major</a:t>
+            </a:r>
+            <a:r>
+              <a:rPr lang="en-US" sz="1800" dirty="0">
+                <a:solidFill>
+                  <a:schemeClr val="accent1">
+                    <a:lumMod val="20000"/>
+                    <a:lumOff val="80000"/>
+                  </a:schemeClr>
+                </a:solidFill>
+              </a:rPr>
+              <a:t>` = 'Computer Science')</a:t>
+            </a:r>
+          </a:p>
+        </p:txBody>
+      </p:sp>
+    </p:spTree>
+    <p:extLst>
+      <p:ext uri="{BB962C8B-B14F-4D97-AF65-F5344CB8AC3E}">
+        <p14:creationId xmlns:p14="http://schemas.microsoft.com/office/powerpoint/2010/main" val="193315656"/>
+      </p:ext>
+    </p:extLst>
+  </p:cSld>
+  <p:clrMapOvr>
+    <a:masterClrMapping/>
+  </p:clrMapOvr>
+  <p:transition>
+    <p:fade/>
+  </p:transition>
+</p:sld>
+</file>
+
+<file path=ppt/slides/slide16.xml><?xml version="1.0" encoding="utf-8"?>
+<p:sld xmlns:a="http://schemas.openxmlformats.org/drawingml/2006/main" xmlns:r="http://schemas.openxmlformats.org/officeDocument/2006/relationships" xmlns:p="http://schemas.openxmlformats.org/presentationml/2006/main">
+  <p:cSld>
+    <p:spTree>
+      <p:nvGrpSpPr>
+        <p:cNvPr id="1" name=""/>
+        <p:cNvGrpSpPr/>
+        <p:nvPr/>
+      </p:nvGrpSpPr>
+      <p:grpSpPr>
+        <a:xfrm>
+          <a:off x="0" y="0"/>
+          <a:ext cx="0" cy="0"/>
+          <a:chOff x="0" y="0"/>
+          <a:chExt cx="0" cy="0"/>
+        </a:xfrm>
+      </p:grpSpPr>
+      <p:sp>
+        <p:nvSpPr>
+          <p:cNvPr id="2" name="Title 1">
+            <a:extLst>
+              <a:ext uri="{FF2B5EF4-FFF2-40B4-BE49-F238E27FC236}">
+                <a16:creationId xmlns:a16="http://schemas.microsoft.com/office/drawing/2014/main" id="{B7D7D780-B60A-45A9-8B7D-989AE81C6909}"/>
+              </a:ext>
+            </a:extLst>
+          </p:cNvPr>
+          <p:cNvSpPr>
+            <a:spLocks noGrp="1"/>
+          </p:cNvSpPr>
+          <p:nvPr>
+            <p:ph type="ctrTitle"/>
+          </p:nvPr>
+        </p:nvSpPr>
+        <p:spPr>
+          <a:xfrm>
+            <a:off x="1371600" y="0"/>
+            <a:ext cx="7043208" cy="990600"/>
+          </a:xfrm>
+        </p:spPr>
+        <p:txBody>
+          <a:bodyPr/>
+          <a:lstStyle/>
+          <a:p>
+            <a:pPr algn="ctr"/>
+            <a:r>
+              <a:rPr lang="en-US" dirty="0"/>
+              <a:t>View #1</a:t>
+            </a:r>
+          </a:p>
+        </p:txBody>
+      </p:sp>
+      <p:pic>
+        <p:nvPicPr>
+          <p:cNvPr id="5" name="Picture 4">
+            <a:extLst>
+              <a:ext uri="{FF2B5EF4-FFF2-40B4-BE49-F238E27FC236}">
+                <a16:creationId xmlns:a16="http://schemas.microsoft.com/office/drawing/2014/main" id="{1BF1A5D1-E205-47FC-BA74-D7897CDA2C87}"/>
+              </a:ext>
+            </a:extLst>
+          </p:cNvPr>
+          <p:cNvPicPr>
+            <a:picLocks noChangeAspect="1"/>
+          </p:cNvPicPr>
+          <p:nvPr/>
+        </p:nvPicPr>
+        <p:blipFill>
+          <a:blip r:embed="rId2"/>
+          <a:stretch>
+            <a:fillRect/>
+          </a:stretch>
+        </p:blipFill>
+        <p:spPr>
+          <a:xfrm>
+            <a:off x="152400" y="914400"/>
+            <a:ext cx="8839200" cy="4876800"/>
+          </a:xfrm>
+          <a:prstGeom prst="rect">
+            <a:avLst/>
+          </a:prstGeom>
+        </p:spPr>
+      </p:pic>
+    </p:spTree>
+    <p:extLst>
+      <p:ext uri="{BB962C8B-B14F-4D97-AF65-F5344CB8AC3E}">
+        <p14:creationId xmlns:p14="http://schemas.microsoft.com/office/powerpoint/2010/main" val="1689887421"/>
+      </p:ext>
+    </p:extLst>
+  </p:cSld>
+  <p:clrMapOvr>
+    <a:masterClrMapping/>
+  </p:clrMapOvr>
+  <p:transition>
+    <p:fade/>
+  </p:transition>
+</p:sld>
+</file>
+
+<file path=ppt/slides/slide17.xml><?xml version="1.0" encoding="utf-8"?>
+<p:sld xmlns:a="http://schemas.openxmlformats.org/drawingml/2006/main" xmlns:r="http://schemas.openxmlformats.org/officeDocument/2006/relationships" xmlns:p="http://schemas.openxmlformats.org/presentationml/2006/main">
+  <p:cSld>
+    <p:spTree>
+      <p:nvGrpSpPr>
+        <p:cNvPr id="1" name=""/>
+        <p:cNvGrpSpPr/>
+        <p:nvPr/>
+      </p:nvGrpSpPr>
+      <p:grpSpPr>
+        <a:xfrm>
+          <a:off x="0" y="0"/>
+          <a:ext cx="0" cy="0"/>
+          <a:chOff x="0" y="0"/>
+          <a:chExt cx="0" cy="0"/>
+        </a:xfrm>
+      </p:grpSpPr>
+      <p:sp>
+        <p:nvSpPr>
+          <p:cNvPr id="2" name="Title 1">
+            <a:extLst>
+              <a:ext uri="{FF2B5EF4-FFF2-40B4-BE49-F238E27FC236}">
+                <a16:creationId xmlns:a16="http://schemas.microsoft.com/office/drawing/2014/main" id="{C3FE6E61-1F2E-4960-AC2C-6E058C560AA6}"/>
+              </a:ext>
+            </a:extLst>
+          </p:cNvPr>
+          <p:cNvSpPr>
+            <a:spLocks noGrp="1"/>
+          </p:cNvSpPr>
+          <p:nvPr>
+            <p:ph type="ctrTitle"/>
+          </p:nvPr>
+        </p:nvSpPr>
+        <p:spPr>
+          <a:xfrm>
+            <a:off x="1369219" y="76201"/>
+            <a:ext cx="7043208" cy="914399"/>
+          </a:xfrm>
+        </p:spPr>
+        <p:txBody>
+          <a:bodyPr/>
+          <a:lstStyle/>
+          <a:p>
+            <a:pPr algn="ctr"/>
+            <a:r>
+              <a:rPr lang="en-US" dirty="0"/>
+              <a:t>View #2</a:t>
+            </a:r>
+          </a:p>
+        </p:txBody>
+      </p:sp>
+      <p:sp>
+        <p:nvSpPr>
+          <p:cNvPr id="3" name="Subtitle 2">
+            <a:extLst>
+              <a:ext uri="{FF2B5EF4-FFF2-40B4-BE49-F238E27FC236}">
+                <a16:creationId xmlns:a16="http://schemas.microsoft.com/office/drawing/2014/main" id="{B55D0FE0-3297-4C3A-9C1F-A8009F77B880}"/>
+              </a:ext>
+            </a:extLst>
+          </p:cNvPr>
+          <p:cNvSpPr>
+            <a:spLocks noGrp="1"/>
+          </p:cNvSpPr>
+          <p:nvPr>
+            <p:ph type="subTitle" idx="1"/>
+          </p:nvPr>
+        </p:nvSpPr>
+        <p:spPr>
+          <a:xfrm>
+            <a:off x="1369219" y="914400"/>
+            <a:ext cx="7043208" cy="1528465"/>
+          </a:xfrm>
+        </p:spPr>
+        <p:txBody>
+          <a:bodyPr/>
+          <a:lstStyle/>
+          <a:p>
+            <a:r>
+              <a:rPr lang="en-US" sz="1800" dirty="0"/>
+              <a:t>The below view </a:t>
+            </a:r>
+            <a:r>
+              <a:rPr lang="en-US" sz="1800" dirty="0" err="1"/>
+              <a:t>person_student</a:t>
+            </a:r>
+            <a:r>
+              <a:rPr lang="en-US" sz="1800" dirty="0"/>
+              <a:t> will contain the details of students who have graduated in 2019.</a:t>
+            </a:r>
+          </a:p>
+          <a:p>
+            <a:endParaRPr lang="en-US" sz="1800" dirty="0"/>
+          </a:p>
+          <a:p>
+            <a:r>
+              <a:rPr lang="en-US" sz="1800" dirty="0">
+                <a:solidFill>
+                  <a:schemeClr val="accent1">
+                    <a:lumMod val="20000"/>
+                    <a:lumOff val="80000"/>
+                  </a:schemeClr>
+                </a:solidFill>
+              </a:rPr>
+              <a:t>CREATE </a:t>
+            </a:r>
+          </a:p>
+          <a:p>
+            <a:r>
+              <a:rPr lang="en-US" sz="1800" dirty="0">
+                <a:solidFill>
+                  <a:schemeClr val="accent1">
+                    <a:lumMod val="20000"/>
+                    <a:lumOff val="80000"/>
+                  </a:schemeClr>
+                </a:solidFill>
+              </a:rPr>
+              <a:t>    ALGORITHM = UNDEFINED </a:t>
+            </a:r>
+          </a:p>
+          <a:p>
+            <a:r>
+              <a:rPr lang="en-US" sz="1800" dirty="0">
+                <a:solidFill>
+                  <a:schemeClr val="accent1">
+                    <a:lumMod val="20000"/>
+                    <a:lumOff val="80000"/>
+                  </a:schemeClr>
+                </a:solidFill>
+              </a:rPr>
+              <a:t>    DEFINER = `</a:t>
+            </a:r>
+            <a:r>
+              <a:rPr lang="en-US" sz="1800" dirty="0" err="1">
+                <a:solidFill>
+                  <a:schemeClr val="accent1">
+                    <a:lumMod val="20000"/>
+                    <a:lumOff val="80000"/>
+                  </a:schemeClr>
+                </a:solidFill>
+              </a:rPr>
+              <a:t>root`@`localhost</a:t>
+            </a:r>
+            <a:r>
+              <a:rPr lang="en-US" sz="1800" dirty="0">
+                <a:solidFill>
+                  <a:schemeClr val="accent1">
+                    <a:lumMod val="20000"/>
+                    <a:lumOff val="80000"/>
+                  </a:schemeClr>
+                </a:solidFill>
+              </a:rPr>
+              <a:t>` </a:t>
+            </a:r>
+          </a:p>
+          <a:p>
+            <a:r>
+              <a:rPr lang="en-US" sz="1800" dirty="0">
+                <a:solidFill>
+                  <a:schemeClr val="accent1">
+                    <a:lumMod val="20000"/>
+                    <a:lumOff val="80000"/>
+                  </a:schemeClr>
+                </a:solidFill>
+              </a:rPr>
+              <a:t>    SQL SECURITY DEFINER</a:t>
+            </a:r>
+          </a:p>
+          <a:p>
+            <a:r>
+              <a:rPr lang="en-US" sz="1800" dirty="0">
+                <a:solidFill>
+                  <a:schemeClr val="accent1">
+                    <a:lumMod val="20000"/>
+                    <a:lumOff val="80000"/>
+                  </a:schemeClr>
+                </a:solidFill>
+              </a:rPr>
+              <a:t>VIEW `niner_eats`.`</a:t>
+            </a:r>
+            <a:r>
+              <a:rPr lang="en-US" sz="1800" dirty="0" err="1">
+                <a:solidFill>
+                  <a:schemeClr val="accent1">
+                    <a:lumMod val="20000"/>
+                    <a:lumOff val="80000"/>
+                  </a:schemeClr>
+                </a:solidFill>
+              </a:rPr>
+              <a:t>person_student</a:t>
+            </a:r>
+            <a:r>
+              <a:rPr lang="en-US" sz="1800" dirty="0">
+                <a:solidFill>
+                  <a:schemeClr val="accent1">
+                    <a:lumMod val="20000"/>
+                    <a:lumOff val="80000"/>
+                  </a:schemeClr>
+                </a:solidFill>
+              </a:rPr>
+              <a:t>` AS</a:t>
+            </a:r>
+          </a:p>
+          <a:p>
+            <a:r>
+              <a:rPr lang="en-US" sz="1800" dirty="0">
+                <a:solidFill>
+                  <a:schemeClr val="accent1">
+                    <a:lumMod val="20000"/>
+                    <a:lumOff val="80000"/>
+                  </a:schemeClr>
+                </a:solidFill>
+              </a:rPr>
+              <a:t>    SELECT </a:t>
+            </a:r>
+          </a:p>
+          <a:p>
+            <a:r>
+              <a:rPr lang="en-US" sz="1800" dirty="0">
+                <a:solidFill>
+                  <a:schemeClr val="accent1">
+                    <a:lumMod val="20000"/>
+                    <a:lumOff val="80000"/>
+                  </a:schemeClr>
+                </a:solidFill>
+              </a:rPr>
+              <a:t>        `a`.`</a:t>
+            </a:r>
+            <a:r>
+              <a:rPr lang="en-US" sz="1800" dirty="0" err="1">
+                <a:solidFill>
+                  <a:schemeClr val="accent1">
+                    <a:lumMod val="20000"/>
+                    <a:lumOff val="80000"/>
+                  </a:schemeClr>
+                </a:solidFill>
+              </a:rPr>
+              <a:t>person_id</a:t>
+            </a:r>
+            <a:r>
+              <a:rPr lang="en-US" sz="1800" dirty="0">
+                <a:solidFill>
+                  <a:schemeClr val="accent1">
+                    <a:lumMod val="20000"/>
+                    <a:lumOff val="80000"/>
+                  </a:schemeClr>
+                </a:solidFill>
+              </a:rPr>
+              <a:t>` AS `</a:t>
+            </a:r>
+            <a:r>
+              <a:rPr lang="en-US" sz="1800" dirty="0" err="1">
+                <a:solidFill>
+                  <a:schemeClr val="accent1">
+                    <a:lumMod val="20000"/>
+                    <a:lumOff val="80000"/>
+                  </a:schemeClr>
+                </a:solidFill>
+              </a:rPr>
+              <a:t>person_id</a:t>
+            </a:r>
+            <a:r>
+              <a:rPr lang="en-US" sz="1800" dirty="0">
+                <a:solidFill>
+                  <a:schemeClr val="accent1">
+                    <a:lumMod val="20000"/>
+                    <a:lumOff val="80000"/>
+                  </a:schemeClr>
+                </a:solidFill>
+              </a:rPr>
+              <a:t>`,</a:t>
+            </a:r>
+          </a:p>
+          <a:p>
+            <a:r>
+              <a:rPr lang="en-US" sz="1800" dirty="0">
+                <a:solidFill>
+                  <a:schemeClr val="accent1">
+                    <a:lumMod val="20000"/>
+                    <a:lumOff val="80000"/>
+                  </a:schemeClr>
+                </a:solidFill>
+              </a:rPr>
+              <a:t>        `a`.`</a:t>
+            </a:r>
+            <a:r>
+              <a:rPr lang="en-US" sz="1800" dirty="0" err="1">
+                <a:solidFill>
+                  <a:schemeClr val="accent1">
+                    <a:lumMod val="20000"/>
+                    <a:lumOff val="80000"/>
+                  </a:schemeClr>
+                </a:solidFill>
+              </a:rPr>
+              <a:t>person_name</a:t>
+            </a:r>
+            <a:r>
+              <a:rPr lang="en-US" sz="1800" dirty="0">
+                <a:solidFill>
+                  <a:schemeClr val="accent1">
+                    <a:lumMod val="20000"/>
+                    <a:lumOff val="80000"/>
+                  </a:schemeClr>
+                </a:solidFill>
+              </a:rPr>
+              <a:t>` AS `</a:t>
+            </a:r>
+            <a:r>
+              <a:rPr lang="en-US" sz="1800" dirty="0" err="1">
+                <a:solidFill>
+                  <a:schemeClr val="accent1">
+                    <a:lumMod val="20000"/>
+                    <a:lumOff val="80000"/>
+                  </a:schemeClr>
+                </a:solidFill>
+              </a:rPr>
+              <a:t>person_name</a:t>
+            </a:r>
+            <a:r>
+              <a:rPr lang="en-US" sz="1800" dirty="0">
+                <a:solidFill>
+                  <a:schemeClr val="accent1">
+                    <a:lumMod val="20000"/>
+                    <a:lumOff val="80000"/>
+                  </a:schemeClr>
+                </a:solidFill>
+              </a:rPr>
+              <a:t>`,</a:t>
+            </a:r>
+          </a:p>
+          <a:p>
+            <a:r>
+              <a:rPr lang="en-US" sz="1800" dirty="0">
+                <a:solidFill>
+                  <a:schemeClr val="accent1">
+                    <a:lumMod val="20000"/>
+                    <a:lumOff val="80000"/>
+                  </a:schemeClr>
+                </a:solidFill>
+              </a:rPr>
+              <a:t>        `a`.`</a:t>
+            </a:r>
+            <a:r>
+              <a:rPr lang="en-US" sz="1800" dirty="0" err="1">
+                <a:solidFill>
+                  <a:schemeClr val="accent1">
+                    <a:lumMod val="20000"/>
+                    <a:lumOff val="80000"/>
+                  </a:schemeClr>
+                </a:solidFill>
+              </a:rPr>
+              <a:t>person_email</a:t>
+            </a:r>
+            <a:r>
+              <a:rPr lang="en-US" sz="1800" dirty="0">
+                <a:solidFill>
+                  <a:schemeClr val="accent1">
+                    <a:lumMod val="20000"/>
+                    <a:lumOff val="80000"/>
+                  </a:schemeClr>
+                </a:solidFill>
+              </a:rPr>
+              <a:t>` AS `</a:t>
+            </a:r>
+            <a:r>
+              <a:rPr lang="en-US" sz="1800" dirty="0" err="1">
+                <a:solidFill>
+                  <a:schemeClr val="accent1">
+                    <a:lumMod val="20000"/>
+                    <a:lumOff val="80000"/>
+                  </a:schemeClr>
+                </a:solidFill>
+              </a:rPr>
+              <a:t>person_email</a:t>
+            </a:r>
+            <a:r>
+              <a:rPr lang="en-US" sz="1800" dirty="0">
+                <a:solidFill>
+                  <a:schemeClr val="accent1">
+                    <a:lumMod val="20000"/>
+                    <a:lumOff val="80000"/>
+                  </a:schemeClr>
+                </a:solidFill>
+              </a:rPr>
+              <a:t>`,</a:t>
+            </a:r>
+          </a:p>
+          <a:p>
+            <a:r>
+              <a:rPr lang="en-US" sz="1800" dirty="0">
+                <a:solidFill>
+                  <a:schemeClr val="accent1">
+                    <a:lumMod val="20000"/>
+                    <a:lumOff val="80000"/>
+                  </a:schemeClr>
+                </a:solidFill>
+              </a:rPr>
+              <a:t>        `</a:t>
+            </a:r>
+            <a:r>
+              <a:rPr lang="en-US" sz="1800" dirty="0" err="1">
+                <a:solidFill>
+                  <a:schemeClr val="accent1">
+                    <a:lumMod val="20000"/>
+                    <a:lumOff val="80000"/>
+                  </a:schemeClr>
+                </a:solidFill>
+              </a:rPr>
+              <a:t>a`.`cell</a:t>
+            </a:r>
+            <a:r>
+              <a:rPr lang="en-US" sz="1800" dirty="0">
+                <a:solidFill>
+                  <a:schemeClr val="accent1">
+                    <a:lumMod val="20000"/>
+                    <a:lumOff val="80000"/>
+                  </a:schemeClr>
+                </a:solidFill>
+              </a:rPr>
+              <a:t>` AS `cell`</a:t>
+            </a:r>
+          </a:p>
+          <a:p>
+            <a:r>
+              <a:rPr lang="en-US" sz="1800" dirty="0">
+                <a:solidFill>
+                  <a:schemeClr val="accent1">
+                    <a:lumMod val="20000"/>
+                    <a:lumOff val="80000"/>
+                  </a:schemeClr>
+                </a:solidFill>
+              </a:rPr>
+              <a:t>    FROM</a:t>
+            </a:r>
+          </a:p>
+          <a:p>
+            <a:r>
+              <a:rPr lang="en-US" sz="1800" dirty="0">
+                <a:solidFill>
+                  <a:schemeClr val="accent1">
+                    <a:lumMod val="20000"/>
+                    <a:lumOff val="80000"/>
+                  </a:schemeClr>
+                </a:solidFill>
+              </a:rPr>
+              <a:t>        `</a:t>
+            </a:r>
+            <a:r>
+              <a:rPr lang="en-US" sz="1800" dirty="0" err="1">
+                <a:solidFill>
+                  <a:schemeClr val="accent1">
+                    <a:lumMod val="20000"/>
+                    <a:lumOff val="80000"/>
+                  </a:schemeClr>
+                </a:solidFill>
+              </a:rPr>
+              <a:t>niner_eats`.`person</a:t>
+            </a:r>
+            <a:r>
+              <a:rPr lang="en-US" sz="1800" dirty="0">
+                <a:solidFill>
+                  <a:schemeClr val="accent1">
+                    <a:lumMod val="20000"/>
+                    <a:lumOff val="80000"/>
+                  </a:schemeClr>
+                </a:solidFill>
+              </a:rPr>
+              <a:t>` `a`</a:t>
+            </a:r>
+          </a:p>
+          <a:p>
+            <a:r>
+              <a:rPr lang="en-US" sz="1800" dirty="0">
+                <a:solidFill>
+                  <a:schemeClr val="accent1">
+                    <a:lumMod val="20000"/>
+                    <a:lumOff val="80000"/>
+                  </a:schemeClr>
+                </a:solidFill>
+              </a:rPr>
+              <a:t>    WHERE</a:t>
+            </a:r>
+          </a:p>
+          <a:p>
+            <a:r>
+              <a:rPr lang="en-US" sz="1800" dirty="0">
+                <a:solidFill>
+                  <a:schemeClr val="accent1">
+                    <a:lumMod val="20000"/>
+                    <a:lumOff val="80000"/>
+                  </a:schemeClr>
+                </a:solidFill>
+              </a:rPr>
+              <a:t>        `a`.`</a:t>
+            </a:r>
+            <a:r>
+              <a:rPr lang="en-US" sz="1800" dirty="0" err="1">
+                <a:solidFill>
+                  <a:schemeClr val="accent1">
+                    <a:lumMod val="20000"/>
+                    <a:lumOff val="80000"/>
+                  </a:schemeClr>
+                </a:solidFill>
+              </a:rPr>
+              <a:t>person_id</a:t>
+            </a:r>
+            <a:r>
+              <a:rPr lang="en-US" sz="1800" dirty="0">
+                <a:solidFill>
+                  <a:schemeClr val="accent1">
+                    <a:lumMod val="20000"/>
+                    <a:lumOff val="80000"/>
+                  </a:schemeClr>
+                </a:solidFill>
+              </a:rPr>
+              <a:t>` IN (SELECT </a:t>
+            </a:r>
+          </a:p>
+          <a:p>
+            <a:r>
+              <a:rPr lang="en-US" sz="1800" dirty="0">
+                <a:solidFill>
+                  <a:schemeClr val="accent1">
+                    <a:lumMod val="20000"/>
+                    <a:lumOff val="80000"/>
+                  </a:schemeClr>
+                </a:solidFill>
+              </a:rPr>
+              <a:t>                `niner_eats`.`student`.`</a:t>
+            </a:r>
+            <a:r>
+              <a:rPr lang="en-US" sz="1800" dirty="0" err="1">
+                <a:solidFill>
+                  <a:schemeClr val="accent1">
+                    <a:lumMod val="20000"/>
+                    <a:lumOff val="80000"/>
+                  </a:schemeClr>
+                </a:solidFill>
+              </a:rPr>
+              <a:t>person_id</a:t>
+            </a:r>
+            <a:r>
+              <a:rPr lang="en-US" sz="1800" dirty="0">
+                <a:solidFill>
+                  <a:schemeClr val="accent1">
+                    <a:lumMod val="20000"/>
+                    <a:lumOff val="80000"/>
+                  </a:schemeClr>
+                </a:solidFill>
+              </a:rPr>
+              <a:t>`</a:t>
+            </a:r>
+          </a:p>
+          <a:p>
+            <a:r>
+              <a:rPr lang="en-US" sz="1800" dirty="0">
+                <a:solidFill>
+                  <a:schemeClr val="accent1">
+                    <a:lumMod val="20000"/>
+                    <a:lumOff val="80000"/>
+                  </a:schemeClr>
+                </a:solidFill>
+              </a:rPr>
+              <a:t>            FROM</a:t>
+            </a:r>
+          </a:p>
+          <a:p>
+            <a:r>
+              <a:rPr lang="en-US" sz="1800" dirty="0">
+                <a:solidFill>
+                  <a:schemeClr val="accent1">
+                    <a:lumMod val="20000"/>
+                    <a:lumOff val="80000"/>
+                  </a:schemeClr>
+                </a:solidFill>
+              </a:rPr>
+              <a:t>                `</a:t>
+            </a:r>
+            <a:r>
+              <a:rPr lang="en-US" sz="1800" dirty="0" err="1">
+                <a:solidFill>
+                  <a:schemeClr val="accent1">
+                    <a:lumMod val="20000"/>
+                    <a:lumOff val="80000"/>
+                  </a:schemeClr>
+                </a:solidFill>
+              </a:rPr>
+              <a:t>niner_eats`.`student</a:t>
+            </a:r>
+            <a:r>
+              <a:rPr lang="en-US" sz="1800" dirty="0">
+                <a:solidFill>
+                  <a:schemeClr val="accent1">
+                    <a:lumMod val="20000"/>
+                    <a:lumOff val="80000"/>
+                  </a:schemeClr>
+                </a:solidFill>
+              </a:rPr>
+              <a:t>`</a:t>
+            </a:r>
+          </a:p>
+          <a:p>
+            <a:r>
+              <a:rPr lang="en-US" sz="1800" dirty="0">
+                <a:solidFill>
+                  <a:schemeClr val="accent1">
+                    <a:lumMod val="20000"/>
+                    <a:lumOff val="80000"/>
+                  </a:schemeClr>
+                </a:solidFill>
+              </a:rPr>
+              <a:t>            WHERE</a:t>
+            </a:r>
+          </a:p>
+          <a:p>
+            <a:r>
+              <a:rPr lang="en-US" sz="1800" dirty="0">
+                <a:solidFill>
+                  <a:schemeClr val="accent1">
+                    <a:lumMod val="20000"/>
+                    <a:lumOff val="80000"/>
+                  </a:schemeClr>
+                </a:solidFill>
+              </a:rPr>
+              <a:t>                (`niner_eats`.`student`.`</a:t>
+            </a:r>
+            <a:r>
+              <a:rPr lang="en-US" sz="1800" dirty="0" err="1">
+                <a:solidFill>
+                  <a:schemeClr val="accent1">
+                    <a:lumMod val="20000"/>
+                    <a:lumOff val="80000"/>
+                  </a:schemeClr>
+                </a:solidFill>
+              </a:rPr>
+              <a:t>graduation_year</a:t>
+            </a:r>
+            <a:r>
+              <a:rPr lang="en-US" sz="1800" dirty="0">
+                <a:solidFill>
+                  <a:schemeClr val="accent1">
+                    <a:lumMod val="20000"/>
+                    <a:lumOff val="80000"/>
+                  </a:schemeClr>
+                </a:solidFill>
+              </a:rPr>
+              <a:t>` = 2019))</a:t>
+            </a:r>
+          </a:p>
+        </p:txBody>
+      </p:sp>
+    </p:spTree>
+    <p:extLst>
+      <p:ext uri="{BB962C8B-B14F-4D97-AF65-F5344CB8AC3E}">
+        <p14:creationId xmlns:p14="http://schemas.microsoft.com/office/powerpoint/2010/main" val="2093088444"/>
+      </p:ext>
+    </p:extLst>
+  </p:cSld>
+  <p:clrMapOvr>
+    <a:masterClrMapping/>
+  </p:clrMapOvr>
+  <p:transition>
+    <p:fade/>
+  </p:transition>
+</p:sld>
+</file>
+
+<file path=ppt/slides/slide18.xml><?xml version="1.0" encoding="utf-8"?>
+<p:sld xmlns:a="http://schemas.openxmlformats.org/drawingml/2006/main" xmlns:r="http://schemas.openxmlformats.org/officeDocument/2006/relationships" xmlns:p="http://schemas.openxmlformats.org/presentationml/2006/main">
+  <p:cSld>
+    <p:spTree>
+      <p:nvGrpSpPr>
+        <p:cNvPr id="1" name=""/>
+        <p:cNvGrpSpPr/>
+        <p:nvPr/>
+      </p:nvGrpSpPr>
+      <p:grpSpPr>
+        <a:xfrm>
+          <a:off x="0" y="0"/>
+          <a:ext cx="0" cy="0"/>
+          <a:chOff x="0" y="0"/>
+          <a:chExt cx="0" cy="0"/>
+        </a:xfrm>
+      </p:grpSpPr>
+      <p:sp>
+        <p:nvSpPr>
+          <p:cNvPr id="2" name="Title 1">
+            <a:extLst>
+              <a:ext uri="{FF2B5EF4-FFF2-40B4-BE49-F238E27FC236}">
+                <a16:creationId xmlns:a16="http://schemas.microsoft.com/office/drawing/2014/main" id="{276BB73F-4135-47AD-B84B-6DEA35A8EF72}"/>
+              </a:ext>
+            </a:extLst>
+          </p:cNvPr>
+          <p:cNvSpPr>
+            <a:spLocks noGrp="1"/>
+          </p:cNvSpPr>
+          <p:nvPr>
+            <p:ph type="ctrTitle"/>
+          </p:nvPr>
+        </p:nvSpPr>
+        <p:spPr>
+          <a:xfrm>
+            <a:off x="1369219" y="152401"/>
+            <a:ext cx="7043208" cy="1066800"/>
+          </a:xfrm>
+        </p:spPr>
+        <p:txBody>
+          <a:bodyPr/>
+          <a:lstStyle/>
+          <a:p>
+            <a:pPr algn="ctr"/>
+            <a:r>
+              <a:rPr lang="en-US" dirty="0"/>
+              <a:t>View #2</a:t>
+            </a:r>
+          </a:p>
+        </p:txBody>
+      </p:sp>
+      <p:pic>
+        <p:nvPicPr>
+          <p:cNvPr id="5" name="Picture 4">
+            <a:extLst>
+              <a:ext uri="{FF2B5EF4-FFF2-40B4-BE49-F238E27FC236}">
+                <a16:creationId xmlns:a16="http://schemas.microsoft.com/office/drawing/2014/main" id="{33FF3EFD-D42C-4888-97D9-2371F35A22E6}"/>
+              </a:ext>
+            </a:extLst>
+          </p:cNvPr>
+          <p:cNvPicPr>
+            <a:picLocks noChangeAspect="1"/>
+          </p:cNvPicPr>
+          <p:nvPr/>
+        </p:nvPicPr>
+        <p:blipFill>
+          <a:blip r:embed="rId2"/>
+          <a:stretch>
+            <a:fillRect/>
+          </a:stretch>
+        </p:blipFill>
+        <p:spPr>
+          <a:xfrm>
+            <a:off x="152400" y="1066799"/>
+            <a:ext cx="8763000" cy="4856339"/>
+          </a:xfrm>
+          <a:prstGeom prst="rect">
+            <a:avLst/>
+          </a:prstGeom>
+        </p:spPr>
+      </p:pic>
+    </p:spTree>
+    <p:extLst>
+      <p:ext uri="{BB962C8B-B14F-4D97-AF65-F5344CB8AC3E}">
+        <p14:creationId xmlns:p14="http://schemas.microsoft.com/office/powerpoint/2010/main" val="1237868432"/>
+      </p:ext>
+    </p:extLst>
+  </p:cSld>
+  <p:clrMapOvr>
+    <a:masterClrMapping/>
+  </p:clrMapOvr>
+  <p:transition>
+    <p:fade/>
+  </p:transition>
+</p:sld>
+</file>
+
+<file path=ppt/slides/slide19.xml><?xml version="1.0" encoding="utf-8"?>
+<p:sld xmlns:a="http://schemas.openxmlformats.org/drawingml/2006/main" xmlns:r="http://schemas.openxmlformats.org/officeDocument/2006/relationships" xmlns:p="http://schemas.openxmlformats.org/presentationml/2006/main">
+  <p:cSld>
+    <p:spTree>
+      <p:nvGrpSpPr>
+        <p:cNvPr id="1" name=""/>
+        <p:cNvGrpSpPr/>
+        <p:nvPr/>
+      </p:nvGrpSpPr>
+      <p:grpSpPr>
+        <a:xfrm>
+          <a:off x="0" y="0"/>
+          <a:ext cx="0" cy="0"/>
+          <a:chOff x="0" y="0"/>
+          <a:chExt cx="0" cy="0"/>
+        </a:xfrm>
+      </p:grpSpPr>
+      <p:sp>
+        <p:nvSpPr>
+          <p:cNvPr id="2" name="Title 1">
+            <a:extLst>
+              <a:ext uri="{FF2B5EF4-FFF2-40B4-BE49-F238E27FC236}">
+                <a16:creationId xmlns:a16="http://schemas.microsoft.com/office/drawing/2014/main" id="{8616DC00-E4F7-4F6C-A509-1530E79E3D38}"/>
+              </a:ext>
+            </a:extLst>
+          </p:cNvPr>
+          <p:cNvSpPr>
+            <a:spLocks noGrp="1"/>
+          </p:cNvSpPr>
+          <p:nvPr>
+            <p:ph type="ctrTitle"/>
+          </p:nvPr>
+        </p:nvSpPr>
+        <p:spPr>
+          <a:xfrm>
+            <a:off x="1369219" y="1"/>
+            <a:ext cx="7043208" cy="1066800"/>
+          </a:xfrm>
+        </p:spPr>
+        <p:txBody>
+          <a:bodyPr/>
+          <a:lstStyle/>
+          <a:p>
+            <a:pPr algn="ctr"/>
+            <a:r>
+              <a:rPr lang="en-US" dirty="0"/>
+              <a:t>Index</a:t>
+            </a:r>
+          </a:p>
+        </p:txBody>
+      </p:sp>
+      <p:sp>
+        <p:nvSpPr>
+          <p:cNvPr id="3" name="Subtitle 2">
+            <a:extLst>
+              <a:ext uri="{FF2B5EF4-FFF2-40B4-BE49-F238E27FC236}">
+                <a16:creationId xmlns:a16="http://schemas.microsoft.com/office/drawing/2014/main" id="{C6B2867B-1D35-4527-8508-21454A73D807}"/>
+              </a:ext>
+            </a:extLst>
+          </p:cNvPr>
+          <p:cNvSpPr>
+            <a:spLocks noGrp="1"/>
+          </p:cNvSpPr>
+          <p:nvPr>
+            <p:ph type="subTitle" idx="1"/>
+          </p:nvPr>
+        </p:nvSpPr>
+        <p:spPr>
+          <a:xfrm>
+            <a:off x="731574" y="914400"/>
+            <a:ext cx="7802826" cy="4953000"/>
+          </a:xfrm>
+        </p:spPr>
+        <p:txBody>
+          <a:bodyPr/>
+          <a:lstStyle/>
+          <a:p>
+            <a:r>
+              <a:rPr lang="en-US" sz="1800" dirty="0"/>
+              <a:t>On location table we created an unique index for optimizing query on </a:t>
+            </a:r>
+            <a:r>
+              <a:rPr lang="en-US" sz="1800" dirty="0" err="1"/>
+              <a:t>location_id</a:t>
+            </a:r>
+            <a:r>
+              <a:rPr lang="en-US" sz="1800" dirty="0"/>
+              <a:t> in descending order.</a:t>
+            </a:r>
+          </a:p>
+          <a:p>
+            <a:endParaRPr lang="en-US" sz="1800" dirty="0">
+              <a:solidFill>
+                <a:schemeClr val="accent1">
+                  <a:lumMod val="20000"/>
+                  <a:lumOff val="80000"/>
+                </a:schemeClr>
+              </a:solidFill>
+            </a:endParaRPr>
+          </a:p>
+          <a:p>
+            <a:r>
+              <a:rPr lang="en-US" sz="1800" dirty="0">
+                <a:solidFill>
+                  <a:schemeClr val="accent1">
+                    <a:lumMod val="20000"/>
+                    <a:lumOff val="80000"/>
+                  </a:schemeClr>
+                </a:solidFill>
+              </a:rPr>
+              <a:t>create unique index </a:t>
+            </a:r>
+            <a:r>
+              <a:rPr lang="en-US" sz="1800" dirty="0" err="1">
+                <a:solidFill>
+                  <a:schemeClr val="accent1">
+                    <a:lumMod val="20000"/>
+                    <a:lumOff val="80000"/>
+                  </a:schemeClr>
+                </a:solidFill>
+              </a:rPr>
+              <a:t>location_index_desc</a:t>
+            </a:r>
+            <a:r>
+              <a:rPr lang="en-US" sz="1800" dirty="0">
+                <a:solidFill>
+                  <a:schemeClr val="accent1">
+                    <a:lumMod val="20000"/>
+                    <a:lumOff val="80000"/>
+                  </a:schemeClr>
+                </a:solidFill>
+              </a:rPr>
+              <a:t> on </a:t>
+            </a:r>
+            <a:r>
+              <a:rPr lang="en-US" sz="1800" dirty="0" err="1">
+                <a:solidFill>
+                  <a:schemeClr val="accent1">
+                    <a:lumMod val="20000"/>
+                    <a:lumOff val="80000"/>
+                  </a:schemeClr>
+                </a:solidFill>
+              </a:rPr>
+              <a:t>niner_eats.location</a:t>
+            </a:r>
+            <a:r>
+              <a:rPr lang="en-US" sz="1800" dirty="0">
+                <a:solidFill>
+                  <a:schemeClr val="accent1">
+                    <a:lumMod val="20000"/>
+                    <a:lumOff val="80000"/>
+                  </a:schemeClr>
+                </a:solidFill>
+              </a:rPr>
+              <a:t> (</a:t>
+            </a:r>
+            <a:r>
+              <a:rPr lang="en-US" sz="1800" dirty="0" err="1">
+                <a:solidFill>
+                  <a:schemeClr val="accent1">
+                    <a:lumMod val="20000"/>
+                    <a:lumOff val="80000"/>
+                  </a:schemeClr>
+                </a:solidFill>
+              </a:rPr>
+              <a:t>location_id</a:t>
+            </a:r>
+            <a:r>
+              <a:rPr lang="en-US" sz="1800" dirty="0">
+                <a:solidFill>
+                  <a:schemeClr val="accent1">
+                    <a:lumMod val="20000"/>
+                    <a:lumOff val="80000"/>
+                  </a:schemeClr>
+                </a:solidFill>
+              </a:rPr>
+              <a:t> desc);</a:t>
+            </a:r>
+          </a:p>
+          <a:p>
+            <a:r>
+              <a:rPr lang="en-US" sz="1800" dirty="0">
+                <a:solidFill>
+                  <a:schemeClr val="accent1">
+                    <a:lumMod val="20000"/>
+                    <a:lumOff val="80000"/>
+                  </a:schemeClr>
+                </a:solidFill>
+              </a:rPr>
+              <a:t>show index from </a:t>
+            </a:r>
+            <a:r>
+              <a:rPr lang="en-US" sz="1800" dirty="0" err="1">
+                <a:solidFill>
+                  <a:schemeClr val="accent1">
+                    <a:lumMod val="20000"/>
+                    <a:lumOff val="80000"/>
+                  </a:schemeClr>
+                </a:solidFill>
+              </a:rPr>
+              <a:t>niner_eats.location</a:t>
+            </a:r>
+            <a:endParaRPr lang="en-US" sz="1800" dirty="0">
+              <a:solidFill>
+                <a:schemeClr val="accent1">
+                  <a:lumMod val="20000"/>
+                  <a:lumOff val="80000"/>
+                </a:schemeClr>
+              </a:solidFill>
+            </a:endParaRPr>
+          </a:p>
+          <a:p>
+            <a:endParaRPr lang="en-US" dirty="0"/>
+          </a:p>
+          <a:p>
+            <a:endParaRPr lang="en-US" dirty="0"/>
+          </a:p>
+          <a:p>
+            <a:endParaRPr lang="en-US" dirty="0"/>
+          </a:p>
+          <a:p>
+            <a:endParaRPr lang="en-US" dirty="0"/>
+          </a:p>
+          <a:p>
+            <a:endParaRPr lang="en-US" dirty="0"/>
+          </a:p>
+        </p:txBody>
+      </p:sp>
+      <p:pic>
+        <p:nvPicPr>
+          <p:cNvPr id="5" name="Picture 4">
+            <a:extLst>
+              <a:ext uri="{FF2B5EF4-FFF2-40B4-BE49-F238E27FC236}">
+                <a16:creationId xmlns:a16="http://schemas.microsoft.com/office/drawing/2014/main" id="{4E39BD12-F300-4B7A-8FD8-B29DF6FAD3C3}"/>
+              </a:ext>
+            </a:extLst>
+          </p:cNvPr>
+          <p:cNvPicPr>
+            <a:picLocks noChangeAspect="1"/>
+          </p:cNvPicPr>
+          <p:nvPr/>
+        </p:nvPicPr>
+        <p:blipFill>
+          <a:blip r:embed="rId2"/>
+          <a:stretch>
+            <a:fillRect/>
+          </a:stretch>
+        </p:blipFill>
+        <p:spPr>
+          <a:xfrm>
+            <a:off x="76200" y="2286000"/>
+            <a:ext cx="8991600" cy="3581400"/>
+          </a:xfrm>
+          <a:prstGeom prst="rect">
+            <a:avLst/>
+          </a:prstGeom>
+        </p:spPr>
+      </p:pic>
+    </p:spTree>
+    <p:extLst>
+      <p:ext uri="{BB962C8B-B14F-4D97-AF65-F5344CB8AC3E}">
+        <p14:creationId xmlns:p14="http://schemas.microsoft.com/office/powerpoint/2010/main" val="3107023121"/>
+      </p:ext>
+    </p:extLst>
+  </p:cSld>
+  <p:clrMapOvr>
+    <a:masterClrMapping/>
+  </p:clrMapOvr>
+  <p:transition>
+    <p:fade/>
+  </p:transition>
+</p:sld>
+</file>
+
 <file path=ppt/slides/slide2.xml><?xml version="1.0" encoding="utf-8"?>
 <p:sld xmlns:a="http://schemas.openxmlformats.org/drawingml/2006/main" xmlns:r="http://schemas.openxmlformats.org/officeDocument/2006/relationships" xmlns:p="http://schemas.openxmlformats.org/presentationml/2006/main">
   <p:cSld>
@@ -7202,6 +10483,68 @@
     <p:extLst>
       <p:ext uri="{BB962C8B-B14F-4D97-AF65-F5344CB8AC3E}">
         <p14:creationId xmlns:p14="http://schemas.microsoft.com/office/powerpoint/2010/main" val="907596554"/>
+      </p:ext>
+    </p:extLst>
+  </p:cSld>
+  <p:clrMapOvr>
+    <a:masterClrMapping/>
+  </p:clrMapOvr>
+  <p:transition>
+    <p:fade/>
+  </p:transition>
+</p:sld>
+</file>
+
+<file path=ppt/slides/slide20.xml><?xml version="1.0" encoding="utf-8"?>
+<p:sld xmlns:a="http://schemas.openxmlformats.org/drawingml/2006/main" xmlns:r="http://schemas.openxmlformats.org/officeDocument/2006/relationships" xmlns:p="http://schemas.openxmlformats.org/presentationml/2006/main">
+  <p:cSld>
+    <p:spTree>
+      <p:nvGrpSpPr>
+        <p:cNvPr id="1" name=""/>
+        <p:cNvGrpSpPr/>
+        <p:nvPr/>
+      </p:nvGrpSpPr>
+      <p:grpSpPr>
+        <a:xfrm>
+          <a:off x="0" y="0"/>
+          <a:ext cx="0" cy="0"/>
+          <a:chOff x="0" y="0"/>
+          <a:chExt cx="0" cy="0"/>
+        </a:xfrm>
+      </p:grpSpPr>
+      <p:sp>
+        <p:nvSpPr>
+          <p:cNvPr id="2" name="Title 1">
+            <a:extLst>
+              <a:ext uri="{FF2B5EF4-FFF2-40B4-BE49-F238E27FC236}">
+                <a16:creationId xmlns:a16="http://schemas.microsoft.com/office/drawing/2014/main" id="{89A8F243-DE3A-422C-A83B-4BFE6837E81B}"/>
+              </a:ext>
+            </a:extLst>
+          </p:cNvPr>
+          <p:cNvSpPr>
+            <a:spLocks noGrp="1"/>
+          </p:cNvSpPr>
+          <p:nvPr>
+            <p:ph type="ctrTitle"/>
+          </p:nvPr>
+        </p:nvSpPr>
+        <p:spPr/>
+        <p:txBody>
+          <a:bodyPr/>
+          <a:lstStyle/>
+          <a:p>
+            <a:pPr algn="ctr"/>
+            <a:r>
+              <a:rPr lang="en-US" dirty="0"/>
+              <a:t>User Interface</a:t>
+            </a:r>
+          </a:p>
+        </p:txBody>
+      </p:sp>
+    </p:spTree>
+    <p:extLst>
+      <p:ext uri="{BB962C8B-B14F-4D97-AF65-F5344CB8AC3E}">
+        <p14:creationId xmlns:p14="http://schemas.microsoft.com/office/powerpoint/2010/main" val="3346417252"/>
       </p:ext>
     </p:extLst>
   </p:cSld>

</xml_diff>